<commit_message>
addded screenshot for map not working
</commit_message>
<xml_diff>
--- a/Presentation/presentation.pptx
+++ b/Presentation/presentation.pptx
@@ -15,6 +15,7 @@
     <p:sldId id="267" r:id="rId9"/>
     <p:sldId id="268" r:id="rId10"/>
     <p:sldId id="269" r:id="rId11"/>
+    <p:sldId id="270" r:id="rId12"/>
   </p:sldIdLst>
   <p:sldSz cx="12192000" cy="6858000"/>
   <p:notesSz cx="6858000" cy="9144000"/>
@@ -124,7 +125,8 @@
 <file path=ppt/revisionInfo.xml><?xml version="1.0" encoding="utf-8"?>
 <p1510:revInfo xmlns:a="http://schemas.openxmlformats.org/drawingml/2006/main" xmlns:r="http://schemas.openxmlformats.org/officeDocument/2006/relationships" xmlns:p1510="http://schemas.microsoft.com/office/powerpoint/2015/10/main">
   <p1510:revLst>
-    <p1510:client id="{01C2C1CE-AE9E-4325-979C-BF43015E39DF}" v="120" dt="2025-06-19T09:20:30.820"/>
+    <p1510:client id="{01C2C1CE-AE9E-4325-979C-BF43015E39DF}" v="157" dt="2025-06-19T22:10:05.418"/>
+    <p1510:client id="{A13342F1-B889-46D1-9CD6-CB0794F5B3B1}" v="3" dt="2025-06-19T22:18:22.494"/>
   </p1510:revLst>
 </p1510:revInfo>
 </file>
@@ -132,44 +134,124 @@
 <file path=ppt/changesInfos/changesInfo1.xml><?xml version="1.0" encoding="utf-8"?>
 <pc:chgInfo xmlns:a="http://schemas.openxmlformats.org/drawingml/2006/main" xmlns:r="http://schemas.openxmlformats.org/officeDocument/2006/relationships" xmlns:ac="http://schemas.microsoft.com/office/drawing/2013/main/command" xmlns:pc="http://schemas.microsoft.com/office/powerpoint/2013/main/command">
   <pc:docChgLst>
-    <pc:chgData name="Salah Uddin Momtaz" userId="65d3f7e49ba8d041" providerId="LiveId" clId="{8003D787-2EAD-4B2D-8994-8093B93DEF06}"/>
-    <pc:docChg chg="modSld">
-      <pc:chgData name="Salah Uddin Momtaz" userId="65d3f7e49ba8d041" providerId="LiveId" clId="{8003D787-2EAD-4B2D-8994-8093B93DEF06}" dt="2025-06-19T09:36:48.907" v="4" actId="20577"/>
+    <pc:chgData name="Salah Uddin Momtaz" userId="65d3f7e49ba8d041" providerId="LiveId" clId="{A13342F1-B889-46D1-9CD6-CB0794F5B3B1}"/>
+    <pc:docChg chg="undo custSel addSld modSld">
+      <pc:chgData name="Salah Uddin Momtaz" userId="65d3f7e49ba8d041" providerId="LiveId" clId="{A13342F1-B889-46D1-9CD6-CB0794F5B3B1}" dt="2025-06-19T22:27:50.311" v="144" actId="207"/>
       <pc:docMkLst>
         <pc:docMk/>
       </pc:docMkLst>
-      <pc:sldChg chg="modSp mod">
-        <pc:chgData name="Salah Uddin Momtaz" userId="65d3f7e49ba8d041" providerId="LiveId" clId="{8003D787-2EAD-4B2D-8994-8093B93DEF06}" dt="2025-06-19T09:36:48.907" v="4" actId="20577"/>
+      <pc:sldChg chg="addSp delSp modSp add mod">
+        <pc:chgData name="Salah Uddin Momtaz" userId="65d3f7e49ba8d041" providerId="LiveId" clId="{A13342F1-B889-46D1-9CD6-CB0794F5B3B1}" dt="2025-06-19T22:27:50.311" v="144" actId="207"/>
         <pc:sldMkLst>
           <pc:docMk/>
-          <pc:sldMk cId="3709000512" sldId="262"/>
+          <pc:sldMk cId="174823207" sldId="270"/>
         </pc:sldMkLst>
-        <pc:graphicFrameChg chg="modGraphic">
-          <ac:chgData name="Salah Uddin Momtaz" userId="65d3f7e49ba8d041" providerId="LiveId" clId="{8003D787-2EAD-4B2D-8994-8093B93DEF06}" dt="2025-06-19T09:36:48.907" v="4" actId="20577"/>
-          <ac:graphicFrameMkLst>
+        <pc:spChg chg="mod">
+          <ac:chgData name="Salah Uddin Momtaz" userId="65d3f7e49ba8d041" providerId="LiveId" clId="{A13342F1-B889-46D1-9CD6-CB0794F5B3B1}" dt="2025-06-19T22:16:57.149" v="19" actId="20577"/>
+          <ac:spMkLst>
             <pc:docMk/>
-            <pc:sldMk cId="3709000512" sldId="262"/>
-            <ac:graphicFrameMk id="3" creationId="{432C5CB2-82FC-5F19-3B82-A03A5FD43F11}"/>
-          </ac:graphicFrameMkLst>
-        </pc:graphicFrameChg>
+            <pc:sldMk cId="174823207" sldId="270"/>
+            <ac:spMk id="2" creationId="{8D2328E9-A9A9-F897-110B-E31F83A294F9}"/>
+          </ac:spMkLst>
+        </pc:spChg>
+        <pc:spChg chg="add mod">
+          <ac:chgData name="Salah Uddin Momtaz" userId="65d3f7e49ba8d041" providerId="LiveId" clId="{A13342F1-B889-46D1-9CD6-CB0794F5B3B1}" dt="2025-06-19T22:24:32.764" v="81" actId="403"/>
+          <ac:spMkLst>
+            <pc:docMk/>
+            <pc:sldMk cId="174823207" sldId="270"/>
+            <ac:spMk id="3" creationId="{388ADA92-FAB8-7AC1-9D75-235E6905EA3E}"/>
+          </ac:spMkLst>
+        </pc:spChg>
+        <pc:spChg chg="mod">
+          <ac:chgData name="Salah Uddin Momtaz" userId="65d3f7e49ba8d041" providerId="LiveId" clId="{A13342F1-B889-46D1-9CD6-CB0794F5B3B1}" dt="2025-06-19T22:24:24.018" v="78" actId="403"/>
+          <ac:spMkLst>
+            <pc:docMk/>
+            <pc:sldMk cId="174823207" sldId="270"/>
+            <ac:spMk id="4" creationId="{F24E3A92-AF42-70D4-80DF-50D35F494E9E}"/>
+          </ac:spMkLst>
+        </pc:spChg>
+        <pc:spChg chg="add mod">
+          <ac:chgData name="Salah Uddin Momtaz" userId="65d3f7e49ba8d041" providerId="LiveId" clId="{A13342F1-B889-46D1-9CD6-CB0794F5B3B1}" dt="2025-06-19T22:27:50.311" v="144" actId="207"/>
+          <ac:spMkLst>
+            <pc:docMk/>
+            <pc:sldMk cId="174823207" sldId="270"/>
+            <ac:spMk id="5" creationId="{DE0F6FDF-C61A-408B-9441-09043DC7C96C}"/>
+          </ac:spMkLst>
+        </pc:spChg>
+        <pc:spChg chg="mod">
+          <ac:chgData name="Salah Uddin Momtaz" userId="65d3f7e49ba8d041" providerId="LiveId" clId="{A13342F1-B889-46D1-9CD6-CB0794F5B3B1}" dt="2025-06-19T22:25:30.415" v="88" actId="113"/>
+          <ac:spMkLst>
+            <pc:docMk/>
+            <pc:sldMk cId="174823207" sldId="270"/>
+            <ac:spMk id="6" creationId="{C6A1EBEE-E3DA-F463-15A7-92AE3B6B02B9}"/>
+          </ac:spMkLst>
+        </pc:spChg>
+        <pc:spChg chg="del mod">
+          <ac:chgData name="Salah Uddin Momtaz" userId="65d3f7e49ba8d041" providerId="LiveId" clId="{A13342F1-B889-46D1-9CD6-CB0794F5B3B1}" dt="2025-06-19T22:18:17.325" v="29" actId="478"/>
+          <ac:spMkLst>
+            <pc:docMk/>
+            <pc:sldMk cId="174823207" sldId="270"/>
+            <ac:spMk id="7" creationId="{A25935E8-EA9E-42DB-9207-3373C8098785}"/>
+          </ac:spMkLst>
+        </pc:spChg>
+        <pc:spChg chg="del mod">
+          <ac:chgData name="Salah Uddin Momtaz" userId="65d3f7e49ba8d041" providerId="LiveId" clId="{A13342F1-B889-46D1-9CD6-CB0794F5B3B1}" dt="2025-06-19T22:18:17.325" v="29" actId="478"/>
+          <ac:spMkLst>
+            <pc:docMk/>
+            <pc:sldMk cId="174823207" sldId="270"/>
+            <ac:spMk id="8" creationId="{A600188D-0637-502C-82F7-9A76EA8F45F5}"/>
+          </ac:spMkLst>
+        </pc:spChg>
+        <pc:spChg chg="del">
+          <ac:chgData name="Salah Uddin Momtaz" userId="65d3f7e49ba8d041" providerId="LiveId" clId="{A13342F1-B889-46D1-9CD6-CB0794F5B3B1}" dt="2025-06-19T22:17:05.436" v="20" actId="478"/>
+          <ac:spMkLst>
+            <pc:docMk/>
+            <pc:sldMk cId="174823207" sldId="270"/>
+            <ac:spMk id="9" creationId="{2F3E154C-A3DC-4B1B-40AC-BD0DFFE7F0B9}"/>
+          </ac:spMkLst>
+        </pc:spChg>
+        <pc:spChg chg="del">
+          <ac:chgData name="Salah Uddin Momtaz" userId="65d3f7e49ba8d041" providerId="LiveId" clId="{A13342F1-B889-46D1-9CD6-CB0794F5B3B1}" dt="2025-06-19T22:17:05.436" v="20" actId="478"/>
+          <ac:spMkLst>
+            <pc:docMk/>
+            <pc:sldMk cId="174823207" sldId="270"/>
+            <ac:spMk id="10" creationId="{F34BDB9B-5259-F63A-0206-0E50386EB968}"/>
+          </ac:spMkLst>
+        </pc:spChg>
+        <pc:picChg chg="del">
+          <ac:chgData name="Salah Uddin Momtaz" userId="65d3f7e49ba8d041" providerId="LiveId" clId="{A13342F1-B889-46D1-9CD6-CB0794F5B3B1}" dt="2025-06-19T22:17:05.436" v="20" actId="478"/>
+          <ac:picMkLst>
+            <pc:docMk/>
+            <pc:sldMk cId="174823207" sldId="270"/>
+            <ac:picMk id="8194" creationId="{0755351A-4E0A-C970-4E25-28CC8931B862}"/>
+          </ac:picMkLst>
+        </pc:picChg>
+        <pc:picChg chg="del">
+          <ac:chgData name="Salah Uddin Momtaz" userId="65d3f7e49ba8d041" providerId="LiveId" clId="{A13342F1-B889-46D1-9CD6-CB0794F5B3B1}" dt="2025-06-19T22:17:05.436" v="20" actId="478"/>
+          <ac:picMkLst>
+            <pc:docMk/>
+            <pc:sldMk cId="174823207" sldId="270"/>
+            <ac:picMk id="8196" creationId="{3DCC0588-99F9-85CE-61FA-6C69076971F6}"/>
+          </ac:picMkLst>
+        </pc:picChg>
       </pc:sldChg>
     </pc:docChg>
   </pc:docChgLst>
   <pc:docChgLst>
     <pc:chgData name="Salah Uddin Momtaz" userId="65d3f7e49ba8d041" providerId="LiveId" clId="{01C2C1CE-AE9E-4325-979C-BF43015E39DF}"/>
     <pc:docChg chg="undo custSel addSld delSld modSld">
-      <pc:chgData name="Salah Uddin Momtaz" userId="65d3f7e49ba8d041" providerId="LiveId" clId="{01C2C1CE-AE9E-4325-979C-BF43015E39DF}" dt="2025-06-19T09:24:04.146" v="594" actId="20577"/>
+      <pc:chgData name="Salah Uddin Momtaz" userId="65d3f7e49ba8d041" providerId="LiveId" clId="{01C2C1CE-AE9E-4325-979C-BF43015E39DF}" dt="2025-06-19T22:11:34.113" v="1283" actId="27636"/>
       <pc:docMkLst>
         <pc:docMk/>
       </pc:docMkLst>
-      <pc:sldChg chg="addSp modSp mod">
-        <pc:chgData name="Salah Uddin Momtaz" userId="65d3f7e49ba8d041" providerId="LiveId" clId="{01C2C1CE-AE9E-4325-979C-BF43015E39DF}" dt="2025-06-19T09:24:04.146" v="594" actId="20577"/>
+      <pc:sldChg chg="addSp delSp modSp mod">
+        <pc:chgData name="Salah Uddin Momtaz" userId="65d3f7e49ba8d041" providerId="LiveId" clId="{01C2C1CE-AE9E-4325-979C-BF43015E39DF}" dt="2025-06-19T20:19:41.336" v="823" actId="207"/>
         <pc:sldMkLst>
           <pc:docMk/>
           <pc:sldMk cId="2059383355" sldId="260"/>
         </pc:sldMkLst>
         <pc:spChg chg="add mod">
-          <ac:chgData name="Salah Uddin Momtaz" userId="65d3f7e49ba8d041" providerId="LiveId" clId="{01C2C1CE-AE9E-4325-979C-BF43015E39DF}" dt="2025-06-19T09:18:44.507" v="507" actId="20577"/>
+          <ac:chgData name="Salah Uddin Momtaz" userId="65d3f7e49ba8d041" providerId="LiveId" clId="{01C2C1CE-AE9E-4325-979C-BF43015E39DF}" dt="2025-06-19T19:50:55.592" v="598" actId="17032"/>
           <ac:spMkLst>
             <pc:docMk/>
             <pc:sldMk cId="2059383355" sldId="260"/>
@@ -185,7 +267,7 @@
           </ac:spMkLst>
         </pc:spChg>
         <pc:spChg chg="add mod">
-          <ac:chgData name="Salah Uddin Momtaz" userId="65d3f7e49ba8d041" providerId="LiveId" clId="{01C2C1CE-AE9E-4325-979C-BF43015E39DF}" dt="2025-06-19T09:22:12.263" v="546" actId="20577"/>
+          <ac:chgData name="Salah Uddin Momtaz" userId="65d3f7e49ba8d041" providerId="LiveId" clId="{01C2C1CE-AE9E-4325-979C-BF43015E39DF}" dt="2025-06-19T20:18:46.146" v="811" actId="1076"/>
           <ac:spMkLst>
             <pc:docMk/>
             <pc:sldMk cId="2059383355" sldId="260"/>
@@ -193,7 +275,7 @@
           </ac:spMkLst>
         </pc:spChg>
         <pc:spChg chg="add mod">
-          <ac:chgData name="Salah Uddin Momtaz" userId="65d3f7e49ba8d041" providerId="LiveId" clId="{01C2C1CE-AE9E-4325-979C-BF43015E39DF}" dt="2025-06-19T09:24:04.146" v="594" actId="20577"/>
+          <ac:chgData name="Salah Uddin Momtaz" userId="65d3f7e49ba8d041" providerId="LiveId" clId="{01C2C1CE-AE9E-4325-979C-BF43015E39DF}" dt="2025-06-19T19:51:08.508" v="600" actId="17032"/>
           <ac:spMkLst>
             <pc:docMk/>
             <pc:sldMk cId="2059383355" sldId="260"/>
@@ -201,7 +283,7 @@
           </ac:spMkLst>
         </pc:spChg>
         <pc:spChg chg="mod">
-          <ac:chgData name="Salah Uddin Momtaz" userId="65d3f7e49ba8d041" providerId="LiveId" clId="{01C2C1CE-AE9E-4325-979C-BF43015E39DF}" dt="2025-06-19T09:19:20.915" v="515" actId="20577"/>
+          <ac:chgData name="Salah Uddin Momtaz" userId="65d3f7e49ba8d041" providerId="LiveId" clId="{01C2C1CE-AE9E-4325-979C-BF43015E39DF}" dt="2025-06-19T19:50:44.816" v="595" actId="17032"/>
           <ac:spMkLst>
             <pc:docMk/>
             <pc:sldMk cId="2059383355" sldId="260"/>
@@ -209,7 +291,7 @@
           </ac:spMkLst>
         </pc:spChg>
         <pc:spChg chg="mod">
-          <ac:chgData name="Salah Uddin Momtaz" userId="65d3f7e49ba8d041" providerId="LiveId" clId="{01C2C1CE-AE9E-4325-979C-BF43015E39DF}" dt="2025-06-19T09:21:14.369" v="539" actId="20577"/>
+          <ac:chgData name="Salah Uddin Momtaz" userId="65d3f7e49ba8d041" providerId="LiveId" clId="{01C2C1CE-AE9E-4325-979C-BF43015E39DF}" dt="2025-06-19T19:50:50.857" v="597" actId="17032"/>
           <ac:spMkLst>
             <pc:docMk/>
             <pc:sldMk cId="2059383355" sldId="260"/>
@@ -224,6 +306,86 @@
             <ac:spMk id="10" creationId="{38189BAB-DDBF-F6E6-F8E6-F91260221968}"/>
           </ac:spMkLst>
         </pc:spChg>
+        <pc:spChg chg="add del mod">
+          <ac:chgData name="Salah Uddin Momtaz" userId="65d3f7e49ba8d041" providerId="LiveId" clId="{01C2C1CE-AE9E-4325-979C-BF43015E39DF}" dt="2025-06-19T20:18:00.796" v="807" actId="478"/>
+          <ac:spMkLst>
+            <pc:docMk/>
+            <pc:sldMk cId="2059383355" sldId="260"/>
+            <ac:spMk id="22" creationId="{177DC444-3690-443A-EB32-52DC542CDF21}"/>
+          </ac:spMkLst>
+        </pc:spChg>
+        <pc:spChg chg="add del mod">
+          <ac:chgData name="Salah Uddin Momtaz" userId="65d3f7e49ba8d041" providerId="LiveId" clId="{01C2C1CE-AE9E-4325-979C-BF43015E39DF}" dt="2025-06-19T20:17:58.093" v="806" actId="478"/>
+          <ac:spMkLst>
+            <pc:docMk/>
+            <pc:sldMk cId="2059383355" sldId="260"/>
+            <ac:spMk id="25" creationId="{02EB0823-6F30-9F05-8147-731D3B91309D}"/>
+          </ac:spMkLst>
+        </pc:spChg>
+        <pc:picChg chg="add mod">
+          <ac:chgData name="Salah Uddin Momtaz" userId="65d3f7e49ba8d041" providerId="LiveId" clId="{01C2C1CE-AE9E-4325-979C-BF43015E39DF}" dt="2025-06-19T20:10:55.484" v="725" actId="1076"/>
+          <ac:picMkLst>
+            <pc:docMk/>
+            <pc:sldMk cId="2059383355" sldId="260"/>
+            <ac:picMk id="11" creationId="{D7611CD4-EE41-C987-1A1A-357819B7E812}"/>
+          </ac:picMkLst>
+        </pc:picChg>
+        <pc:picChg chg="add mod">
+          <ac:chgData name="Salah Uddin Momtaz" userId="65d3f7e49ba8d041" providerId="LiveId" clId="{01C2C1CE-AE9E-4325-979C-BF43015E39DF}" dt="2025-06-19T20:11:08.735" v="728" actId="1076"/>
+          <ac:picMkLst>
+            <pc:docMk/>
+            <pc:sldMk cId="2059383355" sldId="260"/>
+            <ac:picMk id="13" creationId="{412CBC0F-5134-ED61-D09D-666E99840AA1}"/>
+          </ac:picMkLst>
+        </pc:picChg>
+        <pc:picChg chg="add mod">
+          <ac:chgData name="Salah Uddin Momtaz" userId="65d3f7e49ba8d041" providerId="LiveId" clId="{01C2C1CE-AE9E-4325-979C-BF43015E39DF}" dt="2025-06-19T20:12:39.634" v="748" actId="207"/>
+          <ac:picMkLst>
+            <pc:docMk/>
+            <pc:sldMk cId="2059383355" sldId="260"/>
+            <ac:picMk id="15" creationId="{591A61D8-3648-7F9A-5BD2-20AFA3AB656E}"/>
+          </ac:picMkLst>
+        </pc:picChg>
+        <pc:picChg chg="add del mod">
+          <ac:chgData name="Salah Uddin Momtaz" userId="65d3f7e49ba8d041" providerId="LiveId" clId="{01C2C1CE-AE9E-4325-979C-BF43015E39DF}" dt="2025-06-19T20:14:51.477" v="773" actId="478"/>
+          <ac:picMkLst>
+            <pc:docMk/>
+            <pc:sldMk cId="2059383355" sldId="260"/>
+            <ac:picMk id="17" creationId="{04622ECE-E684-A5FC-04D6-C41AC93FD7DB}"/>
+          </ac:picMkLst>
+        </pc:picChg>
+        <pc:picChg chg="add mod">
+          <ac:chgData name="Salah Uddin Momtaz" userId="65d3f7e49ba8d041" providerId="LiveId" clId="{01C2C1CE-AE9E-4325-979C-BF43015E39DF}" dt="2025-06-19T20:14:47.004" v="772" actId="207"/>
+          <ac:picMkLst>
+            <pc:docMk/>
+            <pc:sldMk cId="2059383355" sldId="260"/>
+            <ac:picMk id="19" creationId="{7BAF2537-8FE8-368A-37BD-9E1E0D3D7185}"/>
+          </ac:picMkLst>
+        </pc:picChg>
+        <pc:picChg chg="add del mod modCrop">
+          <ac:chgData name="Salah Uddin Momtaz" userId="65d3f7e49ba8d041" providerId="LiveId" clId="{01C2C1CE-AE9E-4325-979C-BF43015E39DF}" dt="2025-06-19T20:18:49.686" v="812" actId="478"/>
+          <ac:picMkLst>
+            <pc:docMk/>
+            <pc:sldMk cId="2059383355" sldId="260"/>
+            <ac:picMk id="21" creationId="{94792132-21C7-4A33-585E-48BA509764E6}"/>
+          </ac:picMkLst>
+        </pc:picChg>
+        <pc:picChg chg="add mod">
+          <ac:chgData name="Salah Uddin Momtaz" userId="65d3f7e49ba8d041" providerId="LiveId" clId="{01C2C1CE-AE9E-4325-979C-BF43015E39DF}" dt="2025-06-19T20:17:52.645" v="805" actId="1076"/>
+          <ac:picMkLst>
+            <pc:docMk/>
+            <pc:sldMk cId="2059383355" sldId="260"/>
+            <ac:picMk id="24" creationId="{81404D2F-307A-D8EA-842A-2AB009FC25E0}"/>
+          </ac:picMkLst>
+        </pc:picChg>
+        <pc:picChg chg="add mod">
+          <ac:chgData name="Salah Uddin Momtaz" userId="65d3f7e49ba8d041" providerId="LiveId" clId="{01C2C1CE-AE9E-4325-979C-BF43015E39DF}" dt="2025-06-19T20:19:41.336" v="823" actId="207"/>
+          <ac:picMkLst>
+            <pc:docMk/>
+            <pc:sldMk cId="2059383355" sldId="260"/>
+            <ac:picMk id="27" creationId="{583C71C2-DF2C-9531-CE0D-023DC4EC5027}"/>
+          </ac:picMkLst>
+        </pc:picChg>
       </pc:sldChg>
       <pc:sldChg chg="delSp modSp mod">
         <pc:chgData name="Salah Uddin Momtaz" userId="65d3f7e49ba8d041" providerId="LiveId" clId="{01C2C1CE-AE9E-4325-979C-BF43015E39DF}" dt="2025-06-19T09:09:54.387" v="470" actId="20577"/>
@@ -265,21 +427,61 @@
         </pc:spChg>
       </pc:sldChg>
       <pc:sldChg chg="addSp delSp modSp mod">
-        <pc:chgData name="Salah Uddin Momtaz" userId="65d3f7e49ba8d041" providerId="LiveId" clId="{01C2C1CE-AE9E-4325-979C-BF43015E39DF}" dt="2025-06-19T08:37:17.852" v="65" actId="1076"/>
+        <pc:chgData name="Salah Uddin Momtaz" userId="65d3f7e49ba8d041" providerId="LiveId" clId="{01C2C1CE-AE9E-4325-979C-BF43015E39DF}" dt="2025-06-19T22:11:34.113" v="1283" actId="27636"/>
         <pc:sldMkLst>
           <pc:docMk/>
           <pc:sldMk cId="3709000512" sldId="262"/>
         </pc:sldMkLst>
-        <pc:graphicFrameChg chg="mod">
-          <ac:chgData name="Salah Uddin Momtaz" userId="65d3f7e49ba8d041" providerId="LiveId" clId="{01C2C1CE-AE9E-4325-979C-BF43015E39DF}" dt="2025-06-19T08:32:48.677" v="28"/>
+        <pc:spChg chg="mod">
+          <ac:chgData name="Salah Uddin Momtaz" userId="65d3f7e49ba8d041" providerId="LiveId" clId="{01C2C1CE-AE9E-4325-979C-BF43015E39DF}" dt="2025-06-19T22:09:58.058" v="1174" actId="1076"/>
+          <ac:spMkLst>
+            <pc:docMk/>
+            <pc:sldMk cId="3709000512" sldId="262"/>
+            <ac:spMk id="4" creationId="{594E1847-C0E4-5B05-8D07-3D0C683466FB}"/>
+          </ac:spMkLst>
+        </pc:spChg>
+        <pc:spChg chg="add del mod">
+          <ac:chgData name="Salah Uddin Momtaz" userId="65d3f7e49ba8d041" providerId="LiveId" clId="{01C2C1CE-AE9E-4325-979C-BF43015E39DF}" dt="2025-06-19T20:20:15.198" v="828" actId="478"/>
+          <ac:spMkLst>
+            <pc:docMk/>
+            <pc:sldMk cId="3709000512" sldId="262"/>
+            <ac:spMk id="7" creationId="{AD5F21B4-705C-A9CA-A2B0-64D0D66A813E}"/>
+          </ac:spMkLst>
+        </pc:spChg>
+        <pc:spChg chg="add mod">
+          <ac:chgData name="Salah Uddin Momtaz" userId="65d3f7e49ba8d041" providerId="LiveId" clId="{01C2C1CE-AE9E-4325-979C-BF43015E39DF}" dt="2025-06-19T22:09:58.058" v="1174" actId="1076"/>
+          <ac:spMkLst>
+            <pc:docMk/>
+            <pc:sldMk cId="3709000512" sldId="262"/>
+            <ac:spMk id="8" creationId="{FEDB8683-4134-3642-3A7B-2073A14FBB5C}"/>
+          </ac:spMkLst>
+        </pc:spChg>
+        <pc:spChg chg="add mod">
+          <ac:chgData name="Salah Uddin Momtaz" userId="65d3f7e49ba8d041" providerId="LiveId" clId="{01C2C1CE-AE9E-4325-979C-BF43015E39DF}" dt="2025-06-19T22:11:34.113" v="1283" actId="27636"/>
+          <ac:spMkLst>
+            <pc:docMk/>
+            <pc:sldMk cId="3709000512" sldId="262"/>
+            <ac:spMk id="9" creationId="{D4CA404D-F850-E4BB-E67A-CD805511CBD2}"/>
+          </ac:spMkLst>
+        </pc:spChg>
+        <pc:graphicFrameChg chg="del mod modGraphic">
+          <ac:chgData name="Salah Uddin Momtaz" userId="65d3f7e49ba8d041" providerId="LiveId" clId="{01C2C1CE-AE9E-4325-979C-BF43015E39DF}" dt="2025-06-19T20:21:24.110" v="842" actId="478"/>
           <ac:graphicFrameMkLst>
             <pc:docMk/>
             <pc:sldMk cId="3709000512" sldId="262"/>
             <ac:graphicFrameMk id="3" creationId="{432C5CB2-82FC-5F19-3B82-A03A5FD43F11}"/>
           </ac:graphicFrameMkLst>
         </pc:graphicFrameChg>
+        <pc:graphicFrameChg chg="add mod modGraphic">
+          <ac:chgData name="Salah Uddin Momtaz" userId="65d3f7e49ba8d041" providerId="LiveId" clId="{01C2C1CE-AE9E-4325-979C-BF43015E39DF}" dt="2025-06-19T22:09:58.058" v="1174" actId="1076"/>
+          <ac:graphicFrameMkLst>
+            <pc:docMk/>
+            <pc:sldMk cId="3709000512" sldId="262"/>
+            <ac:graphicFrameMk id="5" creationId="{81F770E2-E436-876E-DC2C-5A61F65F02C1}"/>
+          </ac:graphicFrameMkLst>
+        </pc:graphicFrameChg>
         <pc:picChg chg="add del mod">
-          <ac:chgData name="Salah Uddin Momtaz" userId="65d3f7e49ba8d041" providerId="LiveId" clId="{01C2C1CE-AE9E-4325-979C-BF43015E39DF}" dt="2025-06-19T08:37:17.852" v="65" actId="1076"/>
+          <ac:chgData name="Salah Uddin Momtaz" userId="65d3f7e49ba8d041" providerId="LiveId" clId="{01C2C1CE-AE9E-4325-979C-BF43015E39DF}" dt="2025-06-19T22:06:28.663" v="1049" actId="14100"/>
           <ac:picMkLst>
             <pc:docMk/>
             <pc:sldMk cId="3709000512" sldId="262"/>
@@ -398,7 +600,7 @@
         </pc:picChg>
       </pc:sldChg>
       <pc:sldChg chg="addSp delSp modSp add mod">
-        <pc:chgData name="Salah Uddin Momtaz" userId="65d3f7e49ba8d041" providerId="LiveId" clId="{01C2C1CE-AE9E-4325-979C-BF43015E39DF}" dt="2025-06-19T08:46:12.112" v="164" actId="17032"/>
+        <pc:chgData name="Salah Uddin Momtaz" userId="65d3f7e49ba8d041" providerId="LiveId" clId="{01C2C1CE-AE9E-4325-979C-BF43015E39DF}" dt="2025-06-19T20:22:57.977" v="851"/>
         <pc:sldMkLst>
           <pc:docMk/>
           <pc:sldMk cId="3399640103" sldId="265"/>
@@ -436,7 +638,7 @@
           </ac:picMkLst>
         </pc:picChg>
         <pc:picChg chg="add mod">
-          <ac:chgData name="Salah Uddin Momtaz" userId="65d3f7e49ba8d041" providerId="LiveId" clId="{01C2C1CE-AE9E-4325-979C-BF43015E39DF}" dt="2025-06-19T08:45:51.450" v="162" actId="1076"/>
+          <ac:chgData name="Salah Uddin Momtaz" userId="65d3f7e49ba8d041" providerId="LiveId" clId="{01C2C1CE-AE9E-4325-979C-BF43015E39DF}" dt="2025-06-19T20:22:57.977" v="851"/>
           <ac:picMkLst>
             <pc:docMk/>
             <pc:sldMk cId="3399640103" sldId="265"/>
@@ -5991,6 +6193,1381 @@
 </p:sld>
 </file>
 
+<file path=ppt/slides/slide11.xml><?xml version="1.0" encoding="utf-8"?>
+<p:sld xmlns:a="http://schemas.openxmlformats.org/drawingml/2006/main" xmlns:r="http://schemas.openxmlformats.org/officeDocument/2006/relationships" xmlns:p="http://schemas.openxmlformats.org/presentationml/2006/main">
+  <p:cSld>
+    <p:spTree>
+      <p:nvGrpSpPr>
+        <p:cNvPr id="1" name="">
+          <a:extLst>
+            <a:ext uri="{FF2B5EF4-FFF2-40B4-BE49-F238E27FC236}">
+              <a16:creationId xmlns:a16="http://schemas.microsoft.com/office/drawing/2014/main" id="{F07302A1-62DB-D8D3-D31B-9F87F92D4ABD}"/>
+            </a:ext>
+          </a:extLst>
+        </p:cNvPr>
+        <p:cNvGrpSpPr/>
+        <p:nvPr/>
+      </p:nvGrpSpPr>
+      <p:grpSpPr>
+        <a:xfrm>
+          <a:off x="0" y="0"/>
+          <a:ext cx="0" cy="0"/>
+          <a:chOff x="0" y="0"/>
+          <a:chExt cx="0" cy="0"/>
+        </a:xfrm>
+      </p:grpSpPr>
+      <p:sp>
+        <p:nvSpPr>
+          <p:cNvPr id="2" name="Title 1">
+            <a:extLst>
+              <a:ext uri="{FF2B5EF4-FFF2-40B4-BE49-F238E27FC236}">
+                <a16:creationId xmlns:a16="http://schemas.microsoft.com/office/drawing/2014/main" id="{8D2328E9-A9A9-F897-110B-E31F83A294F9}"/>
+              </a:ext>
+            </a:extLst>
+          </p:cNvPr>
+          <p:cNvSpPr>
+            <a:spLocks noGrp="1"/>
+          </p:cNvSpPr>
+          <p:nvPr>
+            <p:ph type="title"/>
+          </p:nvPr>
+        </p:nvSpPr>
+        <p:spPr/>
+        <p:txBody>
+          <a:bodyPr>
+            <a:normAutofit/>
+          </a:bodyPr>
+          <a:lstStyle/>
+          <a:p>
+            <a:r>
+              <a:rPr lang="en-US" b="1" dirty="0">
+                <a:solidFill>
+                  <a:schemeClr val="accent5">
+                    <a:lumMod val="50000"/>
+                  </a:schemeClr>
+                </a:solidFill>
+                <a:effectLst>
+                  <a:outerShdw blurRad="38100" dist="38100" dir="2700000" algn="tl">
+                    <a:srgbClr val="000000">
+                      <a:alpha val="43137"/>
+                    </a:srgbClr>
+                  </a:outerShdw>
+                </a:effectLst>
+              </a:rPr>
+              <a:t>Overall Summary</a:t>
+            </a:r>
+            <a:br>
+              <a:rPr lang="en-US" b="1" dirty="0">
+                <a:solidFill>
+                  <a:schemeClr val="accent5">
+                    <a:lumMod val="50000"/>
+                  </a:schemeClr>
+                </a:solidFill>
+                <a:effectLst>
+                  <a:outerShdw blurRad="38100" dist="38100" dir="2700000" algn="tl">
+                    <a:srgbClr val="000000">
+                      <a:alpha val="43137"/>
+                    </a:srgbClr>
+                  </a:outerShdw>
+                </a:effectLst>
+              </a:rPr>
+            </a:br>
+            <a:br>
+              <a:rPr lang="en-US" b="1" dirty="0">
+                <a:solidFill>
+                  <a:schemeClr val="accent5">
+                    <a:lumMod val="50000"/>
+                  </a:schemeClr>
+                </a:solidFill>
+                <a:effectLst>
+                  <a:outerShdw blurRad="38100" dist="38100" dir="2700000" algn="tl">
+                    <a:srgbClr val="000000">
+                      <a:alpha val="43137"/>
+                    </a:srgbClr>
+                  </a:outerShdw>
+                </a:effectLst>
+              </a:rPr>
+            </a:br>
+            <a:endParaRPr lang="en-US" dirty="0"/>
+          </a:p>
+        </p:txBody>
+      </p:sp>
+      <p:sp>
+        <p:nvSpPr>
+          <p:cNvPr id="4" name="Text Placeholder 3">
+            <a:extLst>
+              <a:ext uri="{FF2B5EF4-FFF2-40B4-BE49-F238E27FC236}">
+                <a16:creationId xmlns:a16="http://schemas.microsoft.com/office/drawing/2014/main" id="{F24E3A92-AF42-70D4-80DF-50D35F494E9E}"/>
+              </a:ext>
+            </a:extLst>
+          </p:cNvPr>
+          <p:cNvSpPr>
+            <a:spLocks noGrp="1"/>
+          </p:cNvSpPr>
+          <p:nvPr>
+            <p:ph type="body" sz="half" idx="2"/>
+          </p:nvPr>
+        </p:nvSpPr>
+        <p:spPr>
+          <a:xfrm>
+            <a:off x="839788" y="1566810"/>
+            <a:ext cx="3913317" cy="462338"/>
+          </a:xfrm>
+          <a:solidFill>
+            <a:schemeClr val="accent4">
+              <a:alpha val="50000"/>
+            </a:schemeClr>
+          </a:solidFill>
+          <a:ln>
+            <a:noFill/>
+          </a:ln>
+        </p:spPr>
+        <p:style>
+          <a:lnRef idx="0">
+            <a:scrgbClr r="0" g="0" b="0"/>
+          </a:lnRef>
+          <a:fillRef idx="0">
+            <a:scrgbClr r="0" g="0" b="0"/>
+          </a:fillRef>
+          <a:effectRef idx="0">
+            <a:scrgbClr r="0" g="0" b="0"/>
+          </a:effectRef>
+          <a:fontRef idx="minor">
+            <a:schemeClr val="lt1"/>
+          </a:fontRef>
+        </p:style>
+        <p:txBody>
+          <a:bodyPr>
+            <a:normAutofit/>
+          </a:bodyPr>
+          <a:lstStyle/>
+          <a:p>
+            <a:pPr lvl="1"/>
+            <a:r>
+              <a:rPr lang="en-US" sz="1800" b="1" dirty="0">
+                <a:solidFill>
+                  <a:schemeClr val="accent1"/>
+                </a:solidFill>
+              </a:rPr>
+              <a:t>Key Findings</a:t>
+            </a:r>
+          </a:p>
+        </p:txBody>
+      </p:sp>
+      <p:sp>
+        <p:nvSpPr>
+          <p:cNvPr id="6" name="Text Placeholder 3">
+            <a:extLst>
+              <a:ext uri="{FF2B5EF4-FFF2-40B4-BE49-F238E27FC236}">
+                <a16:creationId xmlns:a16="http://schemas.microsoft.com/office/drawing/2014/main" id="{C6A1EBEE-E3DA-F463-15A7-92AE3B6B02B9}"/>
+              </a:ext>
+            </a:extLst>
+          </p:cNvPr>
+          <p:cNvSpPr txBox="1">
+            <a:spLocks/>
+          </p:cNvSpPr>
+          <p:nvPr/>
+        </p:nvSpPr>
+        <p:spPr>
+          <a:xfrm>
+            <a:off x="951091" y="1923836"/>
+            <a:ext cx="4629405" cy="4358811"/>
+          </a:xfrm>
+          <a:prstGeom prst="rect">
+            <a:avLst/>
+          </a:prstGeom>
+          <a:solidFill>
+            <a:schemeClr val="accent5"/>
+          </a:solidFill>
+          <a:ln>
+            <a:noFill/>
+          </a:ln>
+        </p:spPr>
+        <p:style>
+          <a:lnRef idx="0">
+            <a:scrgbClr r="0" g="0" b="0"/>
+          </a:lnRef>
+          <a:fillRef idx="0">
+            <a:scrgbClr r="0" g="0" b="0"/>
+          </a:fillRef>
+          <a:effectRef idx="0">
+            <a:scrgbClr r="0" g="0" b="0"/>
+          </a:effectRef>
+          <a:fontRef idx="minor">
+            <a:schemeClr val="lt1"/>
+          </a:fontRef>
+        </p:style>
+        <p:txBody>
+          <a:bodyPr vert="horz" lIns="91440" tIns="45720" rIns="91440" bIns="45720" rtlCol="0">
+            <a:normAutofit/>
+          </a:bodyPr>
+          <a:lstStyle>
+            <a:lvl1pPr marL="0" indent="0" algn="l" defTabSz="914400" rtl="0" eaLnBrk="1" latinLnBrk="0" hangingPunct="1">
+              <a:lnSpc>
+                <a:spcPct val="90000"/>
+              </a:lnSpc>
+              <a:spcBef>
+                <a:spcPts val="1000"/>
+              </a:spcBef>
+              <a:buFont typeface="Arial" panose="020B0604020202020204" pitchFamily="34" charset="0"/>
+              <a:buNone/>
+              <a:defRPr sz="1600" kern="1200">
+                <a:solidFill>
+                  <a:schemeClr val="lt1"/>
+                </a:solidFill>
+                <a:latin typeface="+mn-lt"/>
+                <a:ea typeface="+mn-ea"/>
+                <a:cs typeface="+mn-cs"/>
+              </a:defRPr>
+            </a:lvl1pPr>
+            <a:lvl2pPr marL="457200" indent="0" algn="l" defTabSz="914400" rtl="0" eaLnBrk="1" latinLnBrk="0" hangingPunct="1">
+              <a:lnSpc>
+                <a:spcPct val="90000"/>
+              </a:lnSpc>
+              <a:spcBef>
+                <a:spcPts val="500"/>
+              </a:spcBef>
+              <a:buFont typeface="Arial" panose="020B0604020202020204" pitchFamily="34" charset="0"/>
+              <a:buNone/>
+              <a:defRPr sz="1400" kern="1200">
+                <a:solidFill>
+                  <a:schemeClr val="lt1"/>
+                </a:solidFill>
+                <a:latin typeface="+mn-lt"/>
+                <a:ea typeface="+mn-ea"/>
+                <a:cs typeface="+mn-cs"/>
+              </a:defRPr>
+            </a:lvl2pPr>
+            <a:lvl3pPr marL="914400" indent="0" algn="l" defTabSz="914400" rtl="0" eaLnBrk="1" latinLnBrk="0" hangingPunct="1">
+              <a:lnSpc>
+                <a:spcPct val="90000"/>
+              </a:lnSpc>
+              <a:spcBef>
+                <a:spcPts val="500"/>
+              </a:spcBef>
+              <a:buFont typeface="Arial" panose="020B0604020202020204" pitchFamily="34" charset="0"/>
+              <a:buNone/>
+              <a:defRPr sz="1200" kern="1200">
+                <a:solidFill>
+                  <a:schemeClr val="lt1"/>
+                </a:solidFill>
+                <a:latin typeface="+mn-lt"/>
+                <a:ea typeface="+mn-ea"/>
+                <a:cs typeface="+mn-cs"/>
+              </a:defRPr>
+            </a:lvl3pPr>
+            <a:lvl4pPr marL="1371600" indent="0" algn="l" defTabSz="914400" rtl="0" eaLnBrk="1" latinLnBrk="0" hangingPunct="1">
+              <a:lnSpc>
+                <a:spcPct val="90000"/>
+              </a:lnSpc>
+              <a:spcBef>
+                <a:spcPts val="500"/>
+              </a:spcBef>
+              <a:buFont typeface="Arial" panose="020B0604020202020204" pitchFamily="34" charset="0"/>
+              <a:buNone/>
+              <a:defRPr sz="1000" kern="1200">
+                <a:solidFill>
+                  <a:schemeClr val="lt1"/>
+                </a:solidFill>
+                <a:latin typeface="+mn-lt"/>
+                <a:ea typeface="+mn-ea"/>
+                <a:cs typeface="+mn-cs"/>
+              </a:defRPr>
+            </a:lvl4pPr>
+            <a:lvl5pPr marL="1828800" indent="0" algn="l" defTabSz="914400" rtl="0" eaLnBrk="1" latinLnBrk="0" hangingPunct="1">
+              <a:lnSpc>
+                <a:spcPct val="90000"/>
+              </a:lnSpc>
+              <a:spcBef>
+                <a:spcPts val="500"/>
+              </a:spcBef>
+              <a:buFont typeface="Arial" panose="020B0604020202020204" pitchFamily="34" charset="0"/>
+              <a:buNone/>
+              <a:defRPr sz="1000" kern="1200">
+                <a:solidFill>
+                  <a:schemeClr val="lt1"/>
+                </a:solidFill>
+                <a:latin typeface="+mn-lt"/>
+                <a:ea typeface="+mn-ea"/>
+                <a:cs typeface="+mn-cs"/>
+              </a:defRPr>
+            </a:lvl5pPr>
+            <a:lvl6pPr marL="2286000" indent="0" algn="l" defTabSz="914400" rtl="0" eaLnBrk="1" latinLnBrk="0" hangingPunct="1">
+              <a:lnSpc>
+                <a:spcPct val="90000"/>
+              </a:lnSpc>
+              <a:spcBef>
+                <a:spcPts val="500"/>
+              </a:spcBef>
+              <a:buFont typeface="Arial" panose="020B0604020202020204" pitchFamily="34" charset="0"/>
+              <a:buNone/>
+              <a:defRPr sz="1000" kern="1200">
+                <a:solidFill>
+                  <a:schemeClr val="lt1"/>
+                </a:solidFill>
+                <a:latin typeface="+mn-lt"/>
+                <a:ea typeface="+mn-ea"/>
+                <a:cs typeface="+mn-cs"/>
+              </a:defRPr>
+            </a:lvl6pPr>
+            <a:lvl7pPr marL="2743200" indent="0" algn="l" defTabSz="914400" rtl="0" eaLnBrk="1" latinLnBrk="0" hangingPunct="1">
+              <a:lnSpc>
+                <a:spcPct val="90000"/>
+              </a:lnSpc>
+              <a:spcBef>
+                <a:spcPts val="500"/>
+              </a:spcBef>
+              <a:buFont typeface="Arial" panose="020B0604020202020204" pitchFamily="34" charset="0"/>
+              <a:buNone/>
+              <a:defRPr sz="1000" kern="1200">
+                <a:solidFill>
+                  <a:schemeClr val="lt1"/>
+                </a:solidFill>
+                <a:latin typeface="+mn-lt"/>
+                <a:ea typeface="+mn-ea"/>
+                <a:cs typeface="+mn-cs"/>
+              </a:defRPr>
+            </a:lvl7pPr>
+            <a:lvl8pPr marL="3200400" indent="0" algn="l" defTabSz="914400" rtl="0" eaLnBrk="1" latinLnBrk="0" hangingPunct="1">
+              <a:lnSpc>
+                <a:spcPct val="90000"/>
+              </a:lnSpc>
+              <a:spcBef>
+                <a:spcPts val="500"/>
+              </a:spcBef>
+              <a:buFont typeface="Arial" panose="020B0604020202020204" pitchFamily="34" charset="0"/>
+              <a:buNone/>
+              <a:defRPr sz="1000" kern="1200">
+                <a:solidFill>
+                  <a:schemeClr val="lt1"/>
+                </a:solidFill>
+                <a:latin typeface="+mn-lt"/>
+                <a:ea typeface="+mn-ea"/>
+                <a:cs typeface="+mn-cs"/>
+              </a:defRPr>
+            </a:lvl8pPr>
+            <a:lvl9pPr marL="3657600" indent="0" algn="l" defTabSz="914400" rtl="0" eaLnBrk="1" latinLnBrk="0" hangingPunct="1">
+              <a:lnSpc>
+                <a:spcPct val="90000"/>
+              </a:lnSpc>
+              <a:spcBef>
+                <a:spcPts val="500"/>
+              </a:spcBef>
+              <a:buFont typeface="Arial" panose="020B0604020202020204" pitchFamily="34" charset="0"/>
+              <a:buNone/>
+              <a:defRPr sz="1000" kern="1200">
+                <a:solidFill>
+                  <a:schemeClr val="lt1"/>
+                </a:solidFill>
+                <a:latin typeface="+mn-lt"/>
+                <a:ea typeface="+mn-ea"/>
+                <a:cs typeface="+mn-cs"/>
+              </a:defRPr>
+            </a:lvl9pPr>
+          </a:lstStyle>
+          <a:p>
+            <a:pPr marL="285750" indent="-285750">
+              <a:buFont typeface="Arial" panose="020B0604020202020204" pitchFamily="34" charset="0"/>
+              <a:buChar char="•"/>
+            </a:pPr>
+            <a:endParaRPr lang="en-US" sz="1400" b="1" dirty="0">
+              <a:solidFill>
+                <a:schemeClr val="bg1">
+                  <a:lumMod val="95000"/>
+                </a:schemeClr>
+              </a:solidFill>
+            </a:endParaRPr>
+          </a:p>
+          <a:p>
+            <a:pPr marL="742950" lvl="1" indent="-285750">
+              <a:buFont typeface="Arial" panose="020B0604020202020204" pitchFamily="34" charset="0"/>
+              <a:buChar char="•"/>
+            </a:pPr>
+            <a:r>
+              <a:rPr lang="en-US" sz="1600" b="1" dirty="0">
+                <a:solidFill>
+                  <a:srgbClr val="FFFF00"/>
+                </a:solidFill>
+              </a:rPr>
+              <a:t>Phoenix, AZ </a:t>
+            </a:r>
+            <a:r>
+              <a:rPr lang="en-US" sz="1600" dirty="0">
+                <a:solidFill>
+                  <a:schemeClr val="bg1">
+                    <a:lumMod val="95000"/>
+                  </a:schemeClr>
+                </a:solidFill>
+              </a:rPr>
+              <a:t>emerges as highest risk city with 212K+ construction sites but shorter duration projects</a:t>
+            </a:r>
+          </a:p>
+          <a:p>
+            <a:pPr marL="742950" lvl="1" indent="-285750">
+              <a:buFont typeface="Arial" panose="020B0604020202020204" pitchFamily="34" charset="0"/>
+              <a:buChar char="•"/>
+            </a:pPr>
+            <a:endParaRPr lang="en-US" sz="1600" dirty="0">
+              <a:solidFill>
+                <a:schemeClr val="bg1">
+                  <a:lumMod val="95000"/>
+                </a:schemeClr>
+              </a:solidFill>
+            </a:endParaRPr>
+          </a:p>
+          <a:p>
+            <a:pPr marL="742950" lvl="1" indent="-285750">
+              <a:buFont typeface="Arial" panose="020B0604020202020204" pitchFamily="34" charset="0"/>
+              <a:buChar char="•"/>
+            </a:pPr>
+            <a:r>
+              <a:rPr lang="en-US" sz="1600" b="1" dirty="0">
+                <a:solidFill>
+                  <a:schemeClr val="bg1">
+                    <a:lumMod val="95000"/>
+                  </a:schemeClr>
+                </a:solidFill>
+              </a:rPr>
+              <a:t>COVID-19 </a:t>
+            </a:r>
+            <a:r>
+              <a:rPr lang="en-US" sz="1600" b="1" dirty="0">
+                <a:solidFill>
+                  <a:srgbClr val="FFFF00"/>
+                </a:solidFill>
+              </a:rPr>
+              <a:t>shifted construction patterns from Q3 to Q1</a:t>
+            </a:r>
+            <a:r>
+              <a:rPr lang="en-US" sz="1600" dirty="0">
+                <a:solidFill>
+                  <a:schemeClr val="bg1">
+                    <a:lumMod val="95000"/>
+                  </a:schemeClr>
+                </a:solidFill>
+              </a:rPr>
+              <a:t>, requiring adaptive route planning</a:t>
+            </a:r>
+          </a:p>
+          <a:p>
+            <a:pPr marL="742950" lvl="1" indent="-285750">
+              <a:buFont typeface="Arial" panose="020B0604020202020204" pitchFamily="34" charset="0"/>
+              <a:buChar char="•"/>
+            </a:pPr>
+            <a:endParaRPr lang="en-US" sz="1600" b="1" dirty="0">
+              <a:solidFill>
+                <a:schemeClr val="bg1">
+                  <a:lumMod val="95000"/>
+                </a:schemeClr>
+              </a:solidFill>
+            </a:endParaRPr>
+          </a:p>
+          <a:p>
+            <a:pPr marL="742950" lvl="1" indent="-285750">
+              <a:buFont typeface="Arial" panose="020B0604020202020204" pitchFamily="34" charset="0"/>
+              <a:buChar char="•"/>
+            </a:pPr>
+            <a:r>
+              <a:rPr lang="en-US" sz="1600" b="1" dirty="0">
+                <a:solidFill>
+                  <a:srgbClr val="FFFF00"/>
+                </a:solidFill>
+              </a:rPr>
+              <a:t>SF → Pacifica</a:t>
+            </a:r>
+            <a:r>
+              <a:rPr lang="en-US" sz="1600" b="1" dirty="0">
+                <a:solidFill>
+                  <a:schemeClr val="bg1">
+                    <a:lumMod val="95000"/>
+                  </a:schemeClr>
+                </a:solidFill>
+              </a:rPr>
+              <a:t> </a:t>
+            </a:r>
+            <a:r>
+              <a:rPr lang="en-US" sz="1600" dirty="0">
+                <a:solidFill>
+                  <a:schemeClr val="bg1">
+                    <a:lumMod val="95000"/>
+                  </a:schemeClr>
+                </a:solidFill>
+              </a:rPr>
+              <a:t>route shows </a:t>
+            </a:r>
+            <a:r>
+              <a:rPr lang="en-US" sz="1600" b="1" dirty="0">
+                <a:solidFill>
+                  <a:schemeClr val="bg1">
+                    <a:lumMod val="95000"/>
+                  </a:schemeClr>
+                </a:solidFill>
+              </a:rPr>
+              <a:t>minimal construction risk</a:t>
+            </a:r>
+            <a:r>
+              <a:rPr lang="en-US" sz="1600" dirty="0">
+                <a:solidFill>
+                  <a:schemeClr val="bg1">
+                    <a:lumMod val="95000"/>
+                  </a:schemeClr>
+                </a:solidFill>
+              </a:rPr>
+              <a:t>, ideal for initial deployment</a:t>
+            </a:r>
+          </a:p>
+          <a:p>
+            <a:pPr marL="742950" lvl="1" indent="-285750">
+              <a:buFont typeface="Arial" panose="020B0604020202020204" pitchFamily="34" charset="0"/>
+              <a:buChar char="•"/>
+            </a:pPr>
+            <a:endParaRPr lang="en-US" sz="1600" b="1" dirty="0">
+              <a:solidFill>
+                <a:schemeClr val="bg1">
+                  <a:lumMod val="95000"/>
+                </a:schemeClr>
+              </a:solidFill>
+            </a:endParaRPr>
+          </a:p>
+          <a:p>
+            <a:pPr marL="742950" lvl="1" indent="-285750">
+              <a:buFont typeface="Arial" panose="020B0604020202020204" pitchFamily="34" charset="0"/>
+              <a:buChar char="•"/>
+            </a:pPr>
+            <a:r>
+              <a:rPr lang="en-US" sz="1600" b="1" dirty="0">
+                <a:solidFill>
+                  <a:srgbClr val="FFFF00"/>
+                </a:solidFill>
+              </a:rPr>
+              <a:t>Random Forest model </a:t>
+            </a:r>
+            <a:r>
+              <a:rPr lang="en-US" sz="1600" dirty="0">
+                <a:solidFill>
+                  <a:schemeClr val="bg1">
+                    <a:lumMod val="95000"/>
+                  </a:schemeClr>
+                </a:solidFill>
+              </a:rPr>
+              <a:t>achieves over</a:t>
+            </a:r>
+            <a:r>
+              <a:rPr lang="en-US" sz="1600" b="1" dirty="0">
+                <a:solidFill>
+                  <a:schemeClr val="bg1">
+                    <a:lumMod val="95000"/>
+                  </a:schemeClr>
+                </a:solidFill>
+              </a:rPr>
+              <a:t> </a:t>
+            </a:r>
+            <a:r>
+              <a:rPr lang="en-US" sz="1600" b="1" dirty="0">
+                <a:solidFill>
+                  <a:srgbClr val="FFFF00"/>
+                </a:solidFill>
+              </a:rPr>
+              <a:t>30% accuracy</a:t>
+            </a:r>
+            <a:r>
+              <a:rPr lang="en-US" sz="1600" b="1" dirty="0">
+                <a:solidFill>
+                  <a:schemeClr val="bg1">
+                    <a:lumMod val="95000"/>
+                  </a:schemeClr>
+                </a:solidFill>
+              </a:rPr>
+              <a:t> </a:t>
+            </a:r>
+            <a:r>
+              <a:rPr lang="en-US" sz="1600" dirty="0">
+                <a:solidFill>
+                  <a:schemeClr val="bg1">
+                    <a:lumMod val="95000"/>
+                  </a:schemeClr>
+                </a:solidFill>
+              </a:rPr>
+              <a:t>with </a:t>
+            </a:r>
+            <a:r>
+              <a:rPr lang="en-US" sz="1600" b="1" dirty="0">
+                <a:solidFill>
+                  <a:schemeClr val="bg1">
+                    <a:lumMod val="95000"/>
+                  </a:schemeClr>
+                </a:solidFill>
+              </a:rPr>
+              <a:t>distance </a:t>
+            </a:r>
+            <a:r>
+              <a:rPr lang="en-US" sz="1600" dirty="0">
+                <a:solidFill>
+                  <a:schemeClr val="bg1">
+                    <a:lumMod val="95000"/>
+                  </a:schemeClr>
+                </a:solidFill>
+              </a:rPr>
+              <a:t>as primary predictor</a:t>
+            </a:r>
+          </a:p>
+        </p:txBody>
+      </p:sp>
+      <p:sp>
+        <p:nvSpPr>
+          <p:cNvPr id="3" name="Text Placeholder 3">
+            <a:extLst>
+              <a:ext uri="{FF2B5EF4-FFF2-40B4-BE49-F238E27FC236}">
+                <a16:creationId xmlns:a16="http://schemas.microsoft.com/office/drawing/2014/main" id="{388ADA92-FAB8-7AC1-9D75-235E6905EA3E}"/>
+              </a:ext>
+            </a:extLst>
+          </p:cNvPr>
+          <p:cNvSpPr txBox="1">
+            <a:spLocks/>
+          </p:cNvSpPr>
+          <p:nvPr/>
+        </p:nvSpPr>
+        <p:spPr>
+          <a:xfrm>
+            <a:off x="6416943" y="1566810"/>
+            <a:ext cx="3913317" cy="462338"/>
+          </a:xfrm>
+          <a:prstGeom prst="rect">
+            <a:avLst/>
+          </a:prstGeom>
+          <a:solidFill>
+            <a:schemeClr val="accent4">
+              <a:alpha val="50000"/>
+            </a:schemeClr>
+          </a:solidFill>
+        </p:spPr>
+        <p:style>
+          <a:lnRef idx="0">
+            <a:scrgbClr r="0" g="0" b="0"/>
+          </a:lnRef>
+          <a:fillRef idx="0">
+            <a:scrgbClr r="0" g="0" b="0"/>
+          </a:fillRef>
+          <a:effectRef idx="0">
+            <a:scrgbClr r="0" g="0" b="0"/>
+          </a:effectRef>
+          <a:fontRef idx="minor">
+            <a:schemeClr val="lt1"/>
+          </a:fontRef>
+        </p:style>
+        <p:txBody>
+          <a:bodyPr vert="horz" lIns="91440" tIns="45720" rIns="91440" bIns="45720" rtlCol="0">
+            <a:normAutofit/>
+          </a:bodyPr>
+          <a:lstStyle>
+            <a:lvl1pPr marL="0" indent="0" algn="l" defTabSz="914400" rtl="0" eaLnBrk="1" latinLnBrk="0" hangingPunct="1">
+              <a:lnSpc>
+                <a:spcPct val="90000"/>
+              </a:lnSpc>
+              <a:spcBef>
+                <a:spcPts val="1000"/>
+              </a:spcBef>
+              <a:buFont typeface="Arial" panose="020B0604020202020204" pitchFamily="34" charset="0"/>
+              <a:buNone/>
+              <a:defRPr sz="1600" kern="1200">
+                <a:solidFill>
+                  <a:schemeClr val="lt1"/>
+                </a:solidFill>
+                <a:latin typeface="+mn-lt"/>
+                <a:ea typeface="+mn-ea"/>
+                <a:cs typeface="+mn-cs"/>
+              </a:defRPr>
+            </a:lvl1pPr>
+            <a:lvl2pPr marL="457200" indent="0" algn="l" defTabSz="914400" rtl="0" eaLnBrk="1" latinLnBrk="0" hangingPunct="1">
+              <a:lnSpc>
+                <a:spcPct val="90000"/>
+              </a:lnSpc>
+              <a:spcBef>
+                <a:spcPts val="500"/>
+              </a:spcBef>
+              <a:buFont typeface="Arial" panose="020B0604020202020204" pitchFamily="34" charset="0"/>
+              <a:buNone/>
+              <a:defRPr sz="1400" kern="1200">
+                <a:solidFill>
+                  <a:schemeClr val="lt1"/>
+                </a:solidFill>
+                <a:latin typeface="+mn-lt"/>
+                <a:ea typeface="+mn-ea"/>
+                <a:cs typeface="+mn-cs"/>
+              </a:defRPr>
+            </a:lvl2pPr>
+            <a:lvl3pPr marL="914400" indent="0" algn="l" defTabSz="914400" rtl="0" eaLnBrk="1" latinLnBrk="0" hangingPunct="1">
+              <a:lnSpc>
+                <a:spcPct val="90000"/>
+              </a:lnSpc>
+              <a:spcBef>
+                <a:spcPts val="500"/>
+              </a:spcBef>
+              <a:buFont typeface="Arial" panose="020B0604020202020204" pitchFamily="34" charset="0"/>
+              <a:buNone/>
+              <a:defRPr sz="1200" kern="1200">
+                <a:solidFill>
+                  <a:schemeClr val="lt1"/>
+                </a:solidFill>
+                <a:latin typeface="+mn-lt"/>
+                <a:ea typeface="+mn-ea"/>
+                <a:cs typeface="+mn-cs"/>
+              </a:defRPr>
+            </a:lvl3pPr>
+            <a:lvl4pPr marL="1371600" indent="0" algn="l" defTabSz="914400" rtl="0" eaLnBrk="1" latinLnBrk="0" hangingPunct="1">
+              <a:lnSpc>
+                <a:spcPct val="90000"/>
+              </a:lnSpc>
+              <a:spcBef>
+                <a:spcPts val="500"/>
+              </a:spcBef>
+              <a:buFont typeface="Arial" panose="020B0604020202020204" pitchFamily="34" charset="0"/>
+              <a:buNone/>
+              <a:defRPr sz="1000" kern="1200">
+                <a:solidFill>
+                  <a:schemeClr val="lt1"/>
+                </a:solidFill>
+                <a:latin typeface="+mn-lt"/>
+                <a:ea typeface="+mn-ea"/>
+                <a:cs typeface="+mn-cs"/>
+              </a:defRPr>
+            </a:lvl4pPr>
+            <a:lvl5pPr marL="1828800" indent="0" algn="l" defTabSz="914400" rtl="0" eaLnBrk="1" latinLnBrk="0" hangingPunct="1">
+              <a:lnSpc>
+                <a:spcPct val="90000"/>
+              </a:lnSpc>
+              <a:spcBef>
+                <a:spcPts val="500"/>
+              </a:spcBef>
+              <a:buFont typeface="Arial" panose="020B0604020202020204" pitchFamily="34" charset="0"/>
+              <a:buNone/>
+              <a:defRPr sz="1000" kern="1200">
+                <a:solidFill>
+                  <a:schemeClr val="lt1"/>
+                </a:solidFill>
+                <a:latin typeface="+mn-lt"/>
+                <a:ea typeface="+mn-ea"/>
+                <a:cs typeface="+mn-cs"/>
+              </a:defRPr>
+            </a:lvl5pPr>
+            <a:lvl6pPr marL="2286000" indent="0" algn="l" defTabSz="914400" rtl="0" eaLnBrk="1" latinLnBrk="0" hangingPunct="1">
+              <a:lnSpc>
+                <a:spcPct val="90000"/>
+              </a:lnSpc>
+              <a:spcBef>
+                <a:spcPts val="500"/>
+              </a:spcBef>
+              <a:buFont typeface="Arial" panose="020B0604020202020204" pitchFamily="34" charset="0"/>
+              <a:buNone/>
+              <a:defRPr sz="1000" kern="1200">
+                <a:solidFill>
+                  <a:schemeClr val="lt1"/>
+                </a:solidFill>
+                <a:latin typeface="+mn-lt"/>
+                <a:ea typeface="+mn-ea"/>
+                <a:cs typeface="+mn-cs"/>
+              </a:defRPr>
+            </a:lvl6pPr>
+            <a:lvl7pPr marL="2743200" indent="0" algn="l" defTabSz="914400" rtl="0" eaLnBrk="1" latinLnBrk="0" hangingPunct="1">
+              <a:lnSpc>
+                <a:spcPct val="90000"/>
+              </a:lnSpc>
+              <a:spcBef>
+                <a:spcPts val="500"/>
+              </a:spcBef>
+              <a:buFont typeface="Arial" panose="020B0604020202020204" pitchFamily="34" charset="0"/>
+              <a:buNone/>
+              <a:defRPr sz="1000" kern="1200">
+                <a:solidFill>
+                  <a:schemeClr val="lt1"/>
+                </a:solidFill>
+                <a:latin typeface="+mn-lt"/>
+                <a:ea typeface="+mn-ea"/>
+                <a:cs typeface="+mn-cs"/>
+              </a:defRPr>
+            </a:lvl7pPr>
+            <a:lvl8pPr marL="3200400" indent="0" algn="l" defTabSz="914400" rtl="0" eaLnBrk="1" latinLnBrk="0" hangingPunct="1">
+              <a:lnSpc>
+                <a:spcPct val="90000"/>
+              </a:lnSpc>
+              <a:spcBef>
+                <a:spcPts val="500"/>
+              </a:spcBef>
+              <a:buFont typeface="Arial" panose="020B0604020202020204" pitchFamily="34" charset="0"/>
+              <a:buNone/>
+              <a:defRPr sz="1000" kern="1200">
+                <a:solidFill>
+                  <a:schemeClr val="lt1"/>
+                </a:solidFill>
+                <a:latin typeface="+mn-lt"/>
+                <a:ea typeface="+mn-ea"/>
+                <a:cs typeface="+mn-cs"/>
+              </a:defRPr>
+            </a:lvl8pPr>
+            <a:lvl9pPr marL="3657600" indent="0" algn="l" defTabSz="914400" rtl="0" eaLnBrk="1" latinLnBrk="0" hangingPunct="1">
+              <a:lnSpc>
+                <a:spcPct val="90000"/>
+              </a:lnSpc>
+              <a:spcBef>
+                <a:spcPts val="500"/>
+              </a:spcBef>
+              <a:buFont typeface="Arial" panose="020B0604020202020204" pitchFamily="34" charset="0"/>
+              <a:buNone/>
+              <a:defRPr sz="1000" kern="1200">
+                <a:solidFill>
+                  <a:schemeClr val="lt1"/>
+                </a:solidFill>
+                <a:latin typeface="+mn-lt"/>
+                <a:ea typeface="+mn-ea"/>
+                <a:cs typeface="+mn-cs"/>
+              </a:defRPr>
+            </a:lvl9pPr>
+          </a:lstStyle>
+          <a:p>
+            <a:pPr lvl="1"/>
+            <a:r>
+              <a:rPr lang="en-US" sz="1800" b="1" dirty="0">
+                <a:solidFill>
+                  <a:schemeClr val="accent1"/>
+                </a:solidFill>
+              </a:rPr>
+              <a:t>Strategic Recommendations</a:t>
+            </a:r>
+          </a:p>
+        </p:txBody>
+      </p:sp>
+      <p:sp>
+        <p:nvSpPr>
+          <p:cNvPr id="5" name="Text Placeholder 3">
+            <a:extLst>
+              <a:ext uri="{FF2B5EF4-FFF2-40B4-BE49-F238E27FC236}">
+                <a16:creationId xmlns:a16="http://schemas.microsoft.com/office/drawing/2014/main" id="{DE0F6FDF-C61A-408B-9441-09043DC7C96C}"/>
+              </a:ext>
+            </a:extLst>
+          </p:cNvPr>
+          <p:cNvSpPr txBox="1">
+            <a:spLocks/>
+          </p:cNvSpPr>
+          <p:nvPr/>
+        </p:nvSpPr>
+        <p:spPr>
+          <a:xfrm>
+            <a:off x="6528246" y="1923836"/>
+            <a:ext cx="4629405" cy="4358811"/>
+          </a:xfrm>
+          <a:prstGeom prst="rect">
+            <a:avLst/>
+          </a:prstGeom>
+          <a:solidFill>
+            <a:schemeClr val="accent1"/>
+          </a:solidFill>
+          <a:ln>
+            <a:noFill/>
+          </a:ln>
+        </p:spPr>
+        <p:style>
+          <a:lnRef idx="0">
+            <a:scrgbClr r="0" g="0" b="0"/>
+          </a:lnRef>
+          <a:fillRef idx="0">
+            <a:scrgbClr r="0" g="0" b="0"/>
+          </a:fillRef>
+          <a:effectRef idx="0">
+            <a:scrgbClr r="0" g="0" b="0"/>
+          </a:effectRef>
+          <a:fontRef idx="minor">
+            <a:schemeClr val="lt1"/>
+          </a:fontRef>
+        </p:style>
+        <p:txBody>
+          <a:bodyPr vert="horz" lIns="91440" tIns="45720" rIns="91440" bIns="45720" rtlCol="0">
+            <a:normAutofit/>
+          </a:bodyPr>
+          <a:lstStyle>
+            <a:lvl1pPr marL="0" indent="0" algn="l" defTabSz="914400" rtl="0" eaLnBrk="1" latinLnBrk="0" hangingPunct="1">
+              <a:lnSpc>
+                <a:spcPct val="90000"/>
+              </a:lnSpc>
+              <a:spcBef>
+                <a:spcPts val="1000"/>
+              </a:spcBef>
+              <a:buFont typeface="Arial" panose="020B0604020202020204" pitchFamily="34" charset="0"/>
+              <a:buNone/>
+              <a:defRPr sz="1600" kern="1200">
+                <a:solidFill>
+                  <a:schemeClr val="lt1"/>
+                </a:solidFill>
+                <a:latin typeface="+mn-lt"/>
+                <a:ea typeface="+mn-ea"/>
+                <a:cs typeface="+mn-cs"/>
+              </a:defRPr>
+            </a:lvl1pPr>
+            <a:lvl2pPr marL="457200" indent="0" algn="l" defTabSz="914400" rtl="0" eaLnBrk="1" latinLnBrk="0" hangingPunct="1">
+              <a:lnSpc>
+                <a:spcPct val="90000"/>
+              </a:lnSpc>
+              <a:spcBef>
+                <a:spcPts val="500"/>
+              </a:spcBef>
+              <a:buFont typeface="Arial" panose="020B0604020202020204" pitchFamily="34" charset="0"/>
+              <a:buNone/>
+              <a:defRPr sz="1400" kern="1200">
+                <a:solidFill>
+                  <a:schemeClr val="lt1"/>
+                </a:solidFill>
+                <a:latin typeface="+mn-lt"/>
+                <a:ea typeface="+mn-ea"/>
+                <a:cs typeface="+mn-cs"/>
+              </a:defRPr>
+            </a:lvl2pPr>
+            <a:lvl3pPr marL="914400" indent="0" algn="l" defTabSz="914400" rtl="0" eaLnBrk="1" latinLnBrk="0" hangingPunct="1">
+              <a:lnSpc>
+                <a:spcPct val="90000"/>
+              </a:lnSpc>
+              <a:spcBef>
+                <a:spcPts val="500"/>
+              </a:spcBef>
+              <a:buFont typeface="Arial" panose="020B0604020202020204" pitchFamily="34" charset="0"/>
+              <a:buNone/>
+              <a:defRPr sz="1200" kern="1200">
+                <a:solidFill>
+                  <a:schemeClr val="lt1"/>
+                </a:solidFill>
+                <a:latin typeface="+mn-lt"/>
+                <a:ea typeface="+mn-ea"/>
+                <a:cs typeface="+mn-cs"/>
+              </a:defRPr>
+            </a:lvl3pPr>
+            <a:lvl4pPr marL="1371600" indent="0" algn="l" defTabSz="914400" rtl="0" eaLnBrk="1" latinLnBrk="0" hangingPunct="1">
+              <a:lnSpc>
+                <a:spcPct val="90000"/>
+              </a:lnSpc>
+              <a:spcBef>
+                <a:spcPts val="500"/>
+              </a:spcBef>
+              <a:buFont typeface="Arial" panose="020B0604020202020204" pitchFamily="34" charset="0"/>
+              <a:buNone/>
+              <a:defRPr sz="1000" kern="1200">
+                <a:solidFill>
+                  <a:schemeClr val="lt1"/>
+                </a:solidFill>
+                <a:latin typeface="+mn-lt"/>
+                <a:ea typeface="+mn-ea"/>
+                <a:cs typeface="+mn-cs"/>
+              </a:defRPr>
+            </a:lvl4pPr>
+            <a:lvl5pPr marL="1828800" indent="0" algn="l" defTabSz="914400" rtl="0" eaLnBrk="1" latinLnBrk="0" hangingPunct="1">
+              <a:lnSpc>
+                <a:spcPct val="90000"/>
+              </a:lnSpc>
+              <a:spcBef>
+                <a:spcPts val="500"/>
+              </a:spcBef>
+              <a:buFont typeface="Arial" panose="020B0604020202020204" pitchFamily="34" charset="0"/>
+              <a:buNone/>
+              <a:defRPr sz="1000" kern="1200">
+                <a:solidFill>
+                  <a:schemeClr val="lt1"/>
+                </a:solidFill>
+                <a:latin typeface="+mn-lt"/>
+                <a:ea typeface="+mn-ea"/>
+                <a:cs typeface="+mn-cs"/>
+              </a:defRPr>
+            </a:lvl5pPr>
+            <a:lvl6pPr marL="2286000" indent="0" algn="l" defTabSz="914400" rtl="0" eaLnBrk="1" latinLnBrk="0" hangingPunct="1">
+              <a:lnSpc>
+                <a:spcPct val="90000"/>
+              </a:lnSpc>
+              <a:spcBef>
+                <a:spcPts val="500"/>
+              </a:spcBef>
+              <a:buFont typeface="Arial" panose="020B0604020202020204" pitchFamily="34" charset="0"/>
+              <a:buNone/>
+              <a:defRPr sz="1000" kern="1200">
+                <a:solidFill>
+                  <a:schemeClr val="lt1"/>
+                </a:solidFill>
+                <a:latin typeface="+mn-lt"/>
+                <a:ea typeface="+mn-ea"/>
+                <a:cs typeface="+mn-cs"/>
+              </a:defRPr>
+            </a:lvl6pPr>
+            <a:lvl7pPr marL="2743200" indent="0" algn="l" defTabSz="914400" rtl="0" eaLnBrk="1" latinLnBrk="0" hangingPunct="1">
+              <a:lnSpc>
+                <a:spcPct val="90000"/>
+              </a:lnSpc>
+              <a:spcBef>
+                <a:spcPts val="500"/>
+              </a:spcBef>
+              <a:buFont typeface="Arial" panose="020B0604020202020204" pitchFamily="34" charset="0"/>
+              <a:buNone/>
+              <a:defRPr sz="1000" kern="1200">
+                <a:solidFill>
+                  <a:schemeClr val="lt1"/>
+                </a:solidFill>
+                <a:latin typeface="+mn-lt"/>
+                <a:ea typeface="+mn-ea"/>
+                <a:cs typeface="+mn-cs"/>
+              </a:defRPr>
+            </a:lvl7pPr>
+            <a:lvl8pPr marL="3200400" indent="0" algn="l" defTabSz="914400" rtl="0" eaLnBrk="1" latinLnBrk="0" hangingPunct="1">
+              <a:lnSpc>
+                <a:spcPct val="90000"/>
+              </a:lnSpc>
+              <a:spcBef>
+                <a:spcPts val="500"/>
+              </a:spcBef>
+              <a:buFont typeface="Arial" panose="020B0604020202020204" pitchFamily="34" charset="0"/>
+              <a:buNone/>
+              <a:defRPr sz="1000" kern="1200">
+                <a:solidFill>
+                  <a:schemeClr val="lt1"/>
+                </a:solidFill>
+                <a:latin typeface="+mn-lt"/>
+                <a:ea typeface="+mn-ea"/>
+                <a:cs typeface="+mn-cs"/>
+              </a:defRPr>
+            </a:lvl8pPr>
+            <a:lvl9pPr marL="3657600" indent="0" algn="l" defTabSz="914400" rtl="0" eaLnBrk="1" latinLnBrk="0" hangingPunct="1">
+              <a:lnSpc>
+                <a:spcPct val="90000"/>
+              </a:lnSpc>
+              <a:spcBef>
+                <a:spcPts val="500"/>
+              </a:spcBef>
+              <a:buFont typeface="Arial" panose="020B0604020202020204" pitchFamily="34" charset="0"/>
+              <a:buNone/>
+              <a:defRPr sz="1000" kern="1200">
+                <a:solidFill>
+                  <a:schemeClr val="lt1"/>
+                </a:solidFill>
+                <a:latin typeface="+mn-lt"/>
+                <a:ea typeface="+mn-ea"/>
+                <a:cs typeface="+mn-cs"/>
+              </a:defRPr>
+            </a:lvl9pPr>
+          </a:lstStyle>
+          <a:p>
+            <a:pPr marL="285750" indent="-285750">
+              <a:buFont typeface="Arial" panose="020B0604020202020204" pitchFamily="34" charset="0"/>
+              <a:buChar char="•"/>
+            </a:pPr>
+            <a:endParaRPr lang="en-US" sz="1400" b="1" dirty="0">
+              <a:solidFill>
+                <a:schemeClr val="bg1">
+                  <a:lumMod val="95000"/>
+                </a:schemeClr>
+              </a:solidFill>
+            </a:endParaRPr>
+          </a:p>
+          <a:p>
+            <a:pPr marL="742950" lvl="1" indent="-285750">
+              <a:buFont typeface="Arial" panose="020B0604020202020204" pitchFamily="34" charset="0"/>
+              <a:buChar char="•"/>
+            </a:pPr>
+            <a:r>
+              <a:rPr lang="en-US" sz="1600" b="1" dirty="0">
+                <a:solidFill>
+                  <a:schemeClr val="bg1">
+                    <a:lumMod val="95000"/>
+                  </a:schemeClr>
+                </a:solidFill>
+              </a:rPr>
+              <a:t>Prioritize </a:t>
+            </a:r>
+            <a:r>
+              <a:rPr lang="en-US" sz="1600" b="1" dirty="0">
+                <a:solidFill>
+                  <a:srgbClr val="FFFF00"/>
+                </a:solidFill>
+              </a:rPr>
+              <a:t>low-risk routes</a:t>
+            </a:r>
+            <a:r>
+              <a:rPr lang="en-US" sz="1600" dirty="0">
+                <a:solidFill>
+                  <a:srgbClr val="FFFF00"/>
+                </a:solidFill>
+              </a:rPr>
+              <a:t> </a:t>
+            </a:r>
+            <a:r>
+              <a:rPr lang="en-US" sz="1600" dirty="0">
+                <a:solidFill>
+                  <a:schemeClr val="bg1">
+                    <a:lumMod val="95000"/>
+                  </a:schemeClr>
+                </a:solidFill>
+              </a:rPr>
+              <a:t>like SF-Pacifica for initial autonomous deployment</a:t>
+            </a:r>
+          </a:p>
+          <a:p>
+            <a:pPr marL="742950" lvl="1" indent="-285750">
+              <a:buFont typeface="Arial" panose="020B0604020202020204" pitchFamily="34" charset="0"/>
+              <a:buChar char="•"/>
+            </a:pPr>
+            <a:endParaRPr lang="en-US" sz="1600" b="1" dirty="0">
+              <a:solidFill>
+                <a:schemeClr val="bg1">
+                  <a:lumMod val="95000"/>
+                </a:schemeClr>
+              </a:solidFill>
+            </a:endParaRPr>
+          </a:p>
+          <a:p>
+            <a:pPr marL="742950" lvl="1" indent="-285750">
+              <a:buFont typeface="Arial" panose="020B0604020202020204" pitchFamily="34" charset="0"/>
+              <a:buChar char="•"/>
+            </a:pPr>
+            <a:r>
+              <a:rPr lang="en-US" sz="1600" dirty="0">
+                <a:solidFill>
+                  <a:schemeClr val="bg1">
+                    <a:lumMod val="95000"/>
+                  </a:schemeClr>
+                </a:solidFill>
+              </a:rPr>
+              <a:t>Implement</a:t>
+            </a:r>
+            <a:r>
+              <a:rPr lang="en-US" sz="1600" b="1" dirty="0">
+                <a:solidFill>
+                  <a:schemeClr val="bg1">
+                    <a:lumMod val="95000"/>
+                  </a:schemeClr>
+                </a:solidFill>
+              </a:rPr>
+              <a:t> </a:t>
+            </a:r>
+            <a:r>
+              <a:rPr lang="en-US" sz="1600" b="1" dirty="0">
+                <a:solidFill>
+                  <a:srgbClr val="FFFF00"/>
+                </a:solidFill>
+              </a:rPr>
+              <a:t>dynamic routing algorithms</a:t>
+            </a:r>
+            <a:r>
+              <a:rPr lang="en-US" sz="1600" b="1" dirty="0">
+                <a:solidFill>
+                  <a:schemeClr val="bg1">
+                    <a:lumMod val="95000"/>
+                  </a:schemeClr>
+                </a:solidFill>
+              </a:rPr>
+              <a:t> </a:t>
+            </a:r>
+            <a:r>
+              <a:rPr lang="en-US" sz="1600" dirty="0">
+                <a:solidFill>
+                  <a:schemeClr val="bg1">
+                    <a:lumMod val="95000"/>
+                  </a:schemeClr>
+                </a:solidFill>
+              </a:rPr>
+              <a:t>for high-impact cities like </a:t>
+            </a:r>
+            <a:r>
+              <a:rPr lang="en-US" sz="1600" b="1" dirty="0">
+                <a:solidFill>
+                  <a:schemeClr val="bg1">
+                    <a:lumMod val="95000"/>
+                  </a:schemeClr>
+                </a:solidFill>
+              </a:rPr>
+              <a:t>Phoenix </a:t>
+            </a:r>
+            <a:r>
+              <a:rPr lang="en-US" sz="1600" dirty="0">
+                <a:solidFill>
+                  <a:schemeClr val="bg1">
+                    <a:lumMod val="95000"/>
+                  </a:schemeClr>
+                </a:solidFill>
+              </a:rPr>
+              <a:t>and </a:t>
+            </a:r>
+            <a:r>
+              <a:rPr lang="en-US" sz="1600" b="1" dirty="0">
+                <a:solidFill>
+                  <a:schemeClr val="bg1">
+                    <a:lumMod val="95000"/>
+                  </a:schemeClr>
+                </a:solidFill>
+              </a:rPr>
+              <a:t>Chicago</a:t>
+            </a:r>
+          </a:p>
+          <a:p>
+            <a:pPr marL="742950" lvl="1" indent="-285750">
+              <a:buFont typeface="Arial" panose="020B0604020202020204" pitchFamily="34" charset="0"/>
+              <a:buChar char="•"/>
+            </a:pPr>
+            <a:endParaRPr lang="en-US" sz="1600" b="1" dirty="0">
+              <a:solidFill>
+                <a:schemeClr val="bg1">
+                  <a:lumMod val="95000"/>
+                </a:schemeClr>
+              </a:solidFill>
+            </a:endParaRPr>
+          </a:p>
+          <a:p>
+            <a:pPr marL="742950" lvl="1" indent="-285750">
+              <a:buFont typeface="Arial" panose="020B0604020202020204" pitchFamily="34" charset="0"/>
+              <a:buChar char="•"/>
+            </a:pPr>
+            <a:r>
+              <a:rPr lang="en-US" sz="1600" dirty="0">
+                <a:solidFill>
+                  <a:schemeClr val="bg1">
+                    <a:lumMod val="95000"/>
+                  </a:schemeClr>
+                </a:solidFill>
+              </a:rPr>
+              <a:t>Develop </a:t>
+            </a:r>
+            <a:r>
+              <a:rPr lang="en-US" sz="1600" b="1" dirty="0">
+                <a:solidFill>
+                  <a:srgbClr val="FFFF00"/>
+                </a:solidFill>
+              </a:rPr>
+              <a:t>seasonal deployment </a:t>
+            </a:r>
+            <a:r>
+              <a:rPr lang="en-US" sz="1600" b="1" dirty="0">
+                <a:solidFill>
+                  <a:schemeClr val="bg1">
+                    <a:lumMod val="95000"/>
+                  </a:schemeClr>
+                </a:solidFill>
+              </a:rPr>
+              <a:t>strategies </a:t>
+            </a:r>
+            <a:r>
+              <a:rPr lang="en-US" sz="1600" dirty="0">
+                <a:solidFill>
+                  <a:schemeClr val="bg1">
+                    <a:lumMod val="95000"/>
+                  </a:schemeClr>
+                </a:solidFill>
+              </a:rPr>
+              <a:t>accounting for </a:t>
+            </a:r>
+            <a:r>
+              <a:rPr lang="en-US" sz="1600" b="1" dirty="0">
+                <a:solidFill>
+                  <a:schemeClr val="bg1">
+                    <a:lumMod val="95000"/>
+                  </a:schemeClr>
+                </a:solidFill>
+              </a:rPr>
+              <a:t>Q1 construction peaks</a:t>
+            </a:r>
+          </a:p>
+          <a:p>
+            <a:pPr marL="742950" lvl="1" indent="-285750">
+              <a:buFont typeface="Arial" panose="020B0604020202020204" pitchFamily="34" charset="0"/>
+              <a:buChar char="•"/>
+            </a:pPr>
+            <a:endParaRPr lang="en-US" sz="1600" b="1" dirty="0">
+              <a:solidFill>
+                <a:schemeClr val="bg1">
+                  <a:lumMod val="95000"/>
+                </a:schemeClr>
+              </a:solidFill>
+            </a:endParaRPr>
+          </a:p>
+          <a:p>
+            <a:pPr marL="742950" lvl="1" indent="-285750">
+              <a:buFont typeface="Arial" panose="020B0604020202020204" pitchFamily="34" charset="0"/>
+              <a:buChar char="•"/>
+            </a:pPr>
+            <a:r>
+              <a:rPr lang="en-US" sz="1600" dirty="0">
+                <a:solidFill>
+                  <a:schemeClr val="bg1">
+                    <a:lumMod val="95000"/>
+                  </a:schemeClr>
+                </a:solidFill>
+              </a:rPr>
+              <a:t>Enhance </a:t>
+            </a:r>
+            <a:r>
+              <a:rPr lang="en-US" sz="1600" b="1" dirty="0">
+                <a:solidFill>
+                  <a:srgbClr val="FFFF00"/>
+                </a:solidFill>
+              </a:rPr>
+              <a:t>model accuracy</a:t>
+            </a:r>
+            <a:r>
+              <a:rPr lang="en-US" sz="1600" b="1" dirty="0">
+                <a:solidFill>
+                  <a:schemeClr val="bg1">
+                    <a:lumMod val="95000"/>
+                  </a:schemeClr>
+                </a:solidFill>
+              </a:rPr>
+              <a:t> </a:t>
+            </a:r>
+            <a:r>
+              <a:rPr lang="en-US" sz="1600" dirty="0">
+                <a:solidFill>
+                  <a:schemeClr val="bg1">
+                    <a:lumMod val="95000"/>
+                  </a:schemeClr>
+                </a:solidFill>
+              </a:rPr>
+              <a:t>by incorporating </a:t>
+            </a:r>
+            <a:r>
+              <a:rPr lang="en-US" sz="1600" b="1" dirty="0">
+                <a:solidFill>
+                  <a:schemeClr val="bg1">
+                    <a:lumMod val="95000"/>
+                  </a:schemeClr>
+                </a:solidFill>
+              </a:rPr>
+              <a:t>road closure interaction variables, or using geospatial modeling </a:t>
+            </a:r>
+            <a:r>
+              <a:rPr lang="en-US" sz="1600" dirty="0">
+                <a:solidFill>
+                  <a:schemeClr val="bg1">
+                    <a:lumMod val="95000"/>
+                  </a:schemeClr>
+                </a:solidFill>
+              </a:rPr>
+              <a:t>approach</a:t>
+            </a:r>
+            <a:r>
+              <a:rPr lang="en-US" sz="1600" b="1" dirty="0">
+                <a:solidFill>
+                  <a:schemeClr val="bg1">
+                    <a:lumMod val="95000"/>
+                  </a:schemeClr>
+                </a:solidFill>
+              </a:rPr>
+              <a:t> </a:t>
+            </a:r>
+          </a:p>
+        </p:txBody>
+      </p:sp>
+    </p:spTree>
+    <p:extLst>
+      <p:ext uri="{BB962C8B-B14F-4D97-AF65-F5344CB8AC3E}">
+        <p14:creationId xmlns:p14="http://schemas.microsoft.com/office/powerpoint/2010/main" val="174823207"/>
+      </p:ext>
+    </p:extLst>
+  </p:cSld>
+  <p:clrMapOvr>
+    <a:masterClrMapping/>
+  </p:clrMapOvr>
+</p:sld>
+</file>
+
 <file path=ppt/slides/slide2.xml><?xml version="1.0" encoding="utf-8"?>
 <p:sld xmlns:a="http://schemas.openxmlformats.org/drawingml/2006/main" xmlns:r="http://schemas.openxmlformats.org/officeDocument/2006/relationships" xmlns:p="http://schemas.openxmlformats.org/presentationml/2006/main">
   <p:cSld>
@@ -6178,7 +7755,7 @@
             <a:avLst/>
           </a:prstGeom>
           <a:solidFill>
-            <a:schemeClr val="accent6"/>
+            <a:schemeClr val="accent3"/>
           </a:solidFill>
           <a:ln>
             <a:noFill/>
@@ -6238,7 +7815,7 @@
             <a:avLst/>
           </a:prstGeom>
           <a:solidFill>
-            <a:schemeClr val="accent6"/>
+            <a:schemeClr val="accent2"/>
           </a:solidFill>
           <a:ln>
             <a:noFill/>
@@ -6358,7 +7935,7 @@
             <a:avLst/>
           </a:prstGeom>
           <a:solidFill>
-            <a:schemeClr val="accent6"/>
+            <a:schemeClr val="accent5"/>
           </a:solidFill>
           <a:ln>
             <a:noFill/>
@@ -6418,7 +7995,7 @@
             <a:avLst/>
           </a:prstGeom>
           <a:solidFill>
-            <a:schemeClr val="accent6"/>
+            <a:schemeClr val="accent1"/>
           </a:solidFill>
           <a:ln>
             <a:noFill/>
@@ -6478,7 +8055,7 @@
             <a:avLst/>
           </a:prstGeom>
           <a:solidFill>
-            <a:schemeClr val="accent6"/>
+            <a:schemeClr val="accent4"/>
           </a:solidFill>
           <a:ln>
             <a:noFill/>
@@ -6511,16 +8088,255 @@
           <a:p>
             <a:pPr algn="ctr"/>
             <a:r>
-              <a:rPr lang="en-US" i="1"/>
-              <a:t>Continuous </a:t>
-            </a:r>
-            <a:r>
               <a:rPr lang="en-US" i="1" dirty="0"/>
-              <a:t>Data</a:t>
+              <a:t>Continuous Data</a:t>
             </a:r>
           </a:p>
         </p:txBody>
       </p:sp>
+      <p:pic>
+        <p:nvPicPr>
+          <p:cNvPr id="11" name="Picture 10" descr="A black clock with a black background">
+            <a:extLst>
+              <a:ext uri="{FF2B5EF4-FFF2-40B4-BE49-F238E27FC236}">
+                <a16:creationId xmlns:a16="http://schemas.microsoft.com/office/drawing/2014/main" id="{D7611CD4-EE41-C987-1A1A-357819B7E812}"/>
+              </a:ext>
+            </a:extLst>
+          </p:cNvPr>
+          <p:cNvPicPr>
+            <a:picLocks noChangeAspect="1"/>
+          </p:cNvPicPr>
+          <p:nvPr/>
+        </p:nvPicPr>
+        <p:blipFill>
+          <a:blip r:embed="rId2">
+            <a:lum bright="70000" contrast="-70000"/>
+            <a:extLst>
+              <a:ext uri="{28A0092B-C50C-407E-A947-70E740481C1C}">
+                <a14:useLocalDpi xmlns:a14="http://schemas.microsoft.com/office/drawing/2010/main" val="0"/>
+              </a:ext>
+              <a:ext uri="{837473B0-CC2E-450A-ABE3-18F120FF3D39}">
+                <a1611:picAttrSrcUrl xmlns:a1611="http://schemas.microsoft.com/office/drawing/2016/11/main" r:id="rId3"/>
+              </a:ext>
+            </a:extLst>
+          </a:blip>
+          <a:stretch>
+            <a:fillRect/>
+          </a:stretch>
+        </p:blipFill>
+        <p:spPr>
+          <a:xfrm>
+            <a:off x="8848941" y="3680602"/>
+            <a:ext cx="457200" cy="457200"/>
+          </a:xfrm>
+          <a:prstGeom prst="rect">
+            <a:avLst/>
+          </a:prstGeom>
+        </p:spPr>
+      </p:pic>
+      <p:pic>
+        <p:nvPicPr>
+          <p:cNvPr id="13" name="Picture 12" descr="A silhouette of a car">
+            <a:extLst>
+              <a:ext uri="{FF2B5EF4-FFF2-40B4-BE49-F238E27FC236}">
+                <a16:creationId xmlns:a16="http://schemas.microsoft.com/office/drawing/2014/main" id="{412CBC0F-5134-ED61-D09D-666E99840AA1}"/>
+              </a:ext>
+            </a:extLst>
+          </p:cNvPr>
+          <p:cNvPicPr>
+            <a:picLocks noChangeAspect="1"/>
+          </p:cNvPicPr>
+          <p:nvPr/>
+        </p:nvPicPr>
+        <p:blipFill>
+          <a:blip r:embed="rId4">
+            <a:duotone>
+              <a:schemeClr val="accent4">
+                <a:shade val="45000"/>
+                <a:satMod val="135000"/>
+              </a:schemeClr>
+              <a:prstClr val="white"/>
+            </a:duotone>
+            <a:extLst>
+              <a:ext uri="{28A0092B-C50C-407E-A947-70E740481C1C}">
+                <a14:useLocalDpi xmlns:a14="http://schemas.microsoft.com/office/drawing/2010/main" val="0"/>
+              </a:ext>
+              <a:ext uri="{837473B0-CC2E-450A-ABE3-18F120FF3D39}">
+                <a1611:picAttrSrcUrl xmlns:a1611="http://schemas.microsoft.com/office/drawing/2016/11/main" r:id="rId5"/>
+              </a:ext>
+            </a:extLst>
+          </a:blip>
+          <a:stretch>
+            <a:fillRect/>
+          </a:stretch>
+        </p:blipFill>
+        <p:spPr>
+          <a:xfrm>
+            <a:off x="9021089" y="2421148"/>
+            <a:ext cx="457200" cy="347241"/>
+          </a:xfrm>
+          <a:prstGeom prst="rect">
+            <a:avLst/>
+          </a:prstGeom>
+        </p:spPr>
+      </p:pic>
+      <p:pic>
+        <p:nvPicPr>
+          <p:cNvPr id="15" name="Graphic 14">
+            <a:extLst>
+              <a:ext uri="{FF2B5EF4-FFF2-40B4-BE49-F238E27FC236}">
+                <a16:creationId xmlns:a16="http://schemas.microsoft.com/office/drawing/2014/main" id="{591A61D8-3648-7F9A-5BD2-20AFA3AB656E}"/>
+              </a:ext>
+            </a:extLst>
+          </p:cNvPr>
+          <p:cNvPicPr>
+            <a:picLocks noChangeAspect="1"/>
+          </p:cNvPicPr>
+          <p:nvPr/>
+        </p:nvPicPr>
+        <p:blipFill>
+          <a:blip r:embed="rId6">
+            <a:extLst>
+              <a:ext uri="{96DAC541-7B7A-43D3-8B79-37D633B846F1}">
+                <asvg:svgBlip xmlns:asvg="http://schemas.microsoft.com/office/drawing/2016/SVG/main" r:embed="rId7"/>
+              </a:ext>
+              <a:ext uri="{837473B0-CC2E-450A-ABE3-18F120FF3D39}">
+                <a1611:picAttrSrcUrl xmlns:a1611="http://schemas.microsoft.com/office/drawing/2016/11/main" r:id="rId8"/>
+              </a:ext>
+            </a:extLst>
+          </a:blip>
+          <a:stretch>
+            <a:fillRect/>
+          </a:stretch>
+        </p:blipFill>
+        <p:spPr>
+          <a:xfrm>
+            <a:off x="8966809" y="4980320"/>
+            <a:ext cx="429344" cy="457200"/>
+          </a:xfrm>
+          <a:prstGeom prst="rect">
+            <a:avLst/>
+          </a:prstGeom>
+        </p:spPr>
+      </p:pic>
+      <p:pic>
+        <p:nvPicPr>
+          <p:cNvPr id="19" name="Graphic 18">
+            <a:extLst>
+              <a:ext uri="{FF2B5EF4-FFF2-40B4-BE49-F238E27FC236}">
+                <a16:creationId xmlns:a16="http://schemas.microsoft.com/office/drawing/2014/main" id="{7BAF2537-8FE8-368A-37BD-9E1E0D3D7185}"/>
+              </a:ext>
+            </a:extLst>
+          </p:cNvPr>
+          <p:cNvPicPr>
+            <a:picLocks noChangeAspect="1"/>
+          </p:cNvPicPr>
+          <p:nvPr/>
+        </p:nvPicPr>
+        <p:blipFill>
+          <a:blip r:embed="rId9">
+            <a:extLst>
+              <a:ext uri="{96DAC541-7B7A-43D3-8B79-37D633B846F1}">
+                <asvg:svgBlip xmlns:asvg="http://schemas.microsoft.com/office/drawing/2016/SVG/main" r:embed="rId10"/>
+              </a:ext>
+              <a:ext uri="{837473B0-CC2E-450A-ABE3-18F120FF3D39}">
+                <a1611:picAttrSrcUrl xmlns:a1611="http://schemas.microsoft.com/office/drawing/2016/11/main" r:id="rId11"/>
+              </a:ext>
+            </a:extLst>
+          </a:blip>
+          <a:stretch>
+            <a:fillRect/>
+          </a:stretch>
+        </p:blipFill>
+        <p:spPr>
+          <a:xfrm>
+            <a:off x="5837918" y="3633733"/>
+            <a:ext cx="516164" cy="457200"/>
+          </a:xfrm>
+          <a:prstGeom prst="rect">
+            <a:avLst/>
+          </a:prstGeom>
+        </p:spPr>
+      </p:pic>
+      <p:pic>
+        <p:nvPicPr>
+          <p:cNvPr id="24" name="Picture 23" descr="A black background with a black square">
+            <a:extLst>
+              <a:ext uri="{FF2B5EF4-FFF2-40B4-BE49-F238E27FC236}">
+                <a16:creationId xmlns:a16="http://schemas.microsoft.com/office/drawing/2014/main" id="{81404D2F-307A-D8EA-842A-2AB009FC25E0}"/>
+              </a:ext>
+            </a:extLst>
+          </p:cNvPr>
+          <p:cNvPicPr>
+            <a:picLocks noChangeAspect="1"/>
+          </p:cNvPicPr>
+          <p:nvPr/>
+        </p:nvPicPr>
+        <p:blipFill>
+          <a:blip r:embed="rId12">
+            <a:lum bright="70000" contrast="-70000"/>
+            <a:extLst>
+              <a:ext uri="{28A0092B-C50C-407E-A947-70E740481C1C}">
+                <a14:useLocalDpi xmlns:a14="http://schemas.microsoft.com/office/drawing/2010/main" val="0"/>
+              </a:ext>
+              <a:ext uri="{837473B0-CC2E-450A-ABE3-18F120FF3D39}">
+                <a1611:picAttrSrcUrl xmlns:a1611="http://schemas.microsoft.com/office/drawing/2016/11/main" r:id="rId13"/>
+              </a:ext>
+            </a:extLst>
+          </a:blip>
+          <a:stretch>
+            <a:fillRect/>
+          </a:stretch>
+        </p:blipFill>
+        <p:spPr>
+          <a:xfrm rot="676122">
+            <a:off x="5901185" y="4922623"/>
+            <a:ext cx="457200" cy="457200"/>
+          </a:xfrm>
+          <a:prstGeom prst="rect">
+            <a:avLst/>
+          </a:prstGeom>
+        </p:spPr>
+      </p:pic>
+      <p:pic>
+        <p:nvPicPr>
+          <p:cNvPr id="27" name="Graphic 26">
+            <a:extLst>
+              <a:ext uri="{FF2B5EF4-FFF2-40B4-BE49-F238E27FC236}">
+                <a16:creationId xmlns:a16="http://schemas.microsoft.com/office/drawing/2014/main" id="{583C71C2-DF2C-9531-CE0D-023DC4EC5027}"/>
+              </a:ext>
+            </a:extLst>
+          </p:cNvPr>
+          <p:cNvPicPr>
+            <a:picLocks noChangeAspect="1"/>
+          </p:cNvPicPr>
+          <p:nvPr/>
+        </p:nvPicPr>
+        <p:blipFill>
+          <a:blip r:embed="rId14">
+            <a:extLst>
+              <a:ext uri="{96DAC541-7B7A-43D3-8B79-37D633B846F1}">
+                <asvg:svgBlip xmlns:asvg="http://schemas.microsoft.com/office/drawing/2016/SVG/main" r:embed="rId15"/>
+              </a:ext>
+              <a:ext uri="{837473B0-CC2E-450A-ABE3-18F120FF3D39}">
+                <a1611:picAttrSrcUrl xmlns:a1611="http://schemas.microsoft.com/office/drawing/2016/11/main" r:id="rId16"/>
+              </a:ext>
+            </a:extLst>
+          </a:blip>
+          <a:stretch>
+            <a:fillRect/>
+          </a:stretch>
+        </p:blipFill>
+        <p:spPr>
+          <a:xfrm>
+            <a:off x="5760186" y="2291744"/>
+            <a:ext cx="548640" cy="476645"/>
+          </a:xfrm>
+          <a:prstGeom prst="rect">
+            <a:avLst/>
+          </a:prstGeom>
+        </p:spPr>
+      </p:pic>
     </p:spTree>
     <p:extLst>
       <p:ext uri="{BB962C8B-B14F-4D97-AF65-F5344CB8AC3E}">
@@ -6853,14 +8669,19 @@
             <p:ph type="body" sz="half" idx="2"/>
           </p:nvPr>
         </p:nvSpPr>
-        <p:spPr/>
+        <p:spPr>
+          <a:xfrm>
+            <a:off x="839788" y="2098515"/>
+            <a:ext cx="3932237" cy="431900"/>
+          </a:xfrm>
+        </p:spPr>
         <p:txBody>
           <a:bodyPr/>
           <a:lstStyle/>
           <a:p>
             <a:r>
               <a:rPr lang="en-US" b="1" dirty="0"/>
-              <a:t>Top 5 Cities</a:t>
+              <a:t>Top Cities Over 6 years</a:t>
             </a:r>
           </a:p>
           <a:p>
@@ -6868,12 +8689,42 @@
           </a:p>
         </p:txBody>
       </p:sp>
+      <p:pic>
+        <p:nvPicPr>
+          <p:cNvPr id="6" name="Picture 5">
+            <a:extLst>
+              <a:ext uri="{FF2B5EF4-FFF2-40B4-BE49-F238E27FC236}">
+                <a16:creationId xmlns:a16="http://schemas.microsoft.com/office/drawing/2014/main" id="{A7E1D141-1C72-C4FE-32FC-B4DA3CF5497F}"/>
+              </a:ext>
+            </a:extLst>
+          </p:cNvPr>
+          <p:cNvPicPr>
+            <a:picLocks noChangeAspect="1"/>
+          </p:cNvPicPr>
+          <p:nvPr/>
+        </p:nvPicPr>
+        <p:blipFill>
+          <a:blip r:embed="rId2"/>
+          <a:stretch>
+            <a:fillRect/>
+          </a:stretch>
+        </p:blipFill>
+        <p:spPr>
+          <a:xfrm>
+            <a:off x="5587471" y="1397479"/>
+            <a:ext cx="6449254" cy="3847381"/>
+          </a:xfrm>
+          <a:prstGeom prst="rect">
+            <a:avLst/>
+          </a:prstGeom>
+        </p:spPr>
+      </p:pic>
       <p:graphicFrame>
         <p:nvGraphicFramePr>
-          <p:cNvPr id="3" name="Table 2">
-            <a:extLst>
-              <a:ext uri="{FF2B5EF4-FFF2-40B4-BE49-F238E27FC236}">
-                <a16:creationId xmlns:a16="http://schemas.microsoft.com/office/drawing/2014/main" id="{432C5CB2-82FC-5F19-3B82-A03A5FD43F11}"/>
+          <p:cNvPr id="5" name="Table 4">
+            <a:extLst>
+              <a:ext uri="{FF2B5EF4-FFF2-40B4-BE49-F238E27FC236}">
+                <a16:creationId xmlns:a16="http://schemas.microsoft.com/office/drawing/2014/main" id="{81F770E2-E436-876E-DC2C-5A61F65F02C1}"/>
               </a:ext>
             </a:extLst>
           </p:cNvPr>
@@ -6883,14 +8734,14 @@
           <p:nvPr>
             <p:extLst>
               <p:ext uri="{D42A27DB-BD31-4B8C-83A1-F6EECF244321}">
-                <p14:modId xmlns:p14="http://schemas.microsoft.com/office/powerpoint/2010/main" val="3027074423"/>
+                <p14:modId xmlns:p14="http://schemas.microsoft.com/office/powerpoint/2010/main" val="446426954"/>
               </p:ext>
             </p:extLst>
           </p:nvPr>
         </p:nvGraphicFramePr>
         <p:xfrm>
-          <a:off x="839788" y="2489300"/>
-          <a:ext cx="3932235" cy="2472005"/>
+          <a:off x="839788" y="2438401"/>
+          <a:ext cx="4232544" cy="3348873"/>
         </p:xfrm>
         <a:graphic>
           <a:graphicData uri="http://schemas.openxmlformats.org/drawingml/2006/table">
@@ -6899,51 +8750,52 @@
                 <a:tableStyleId>{93296810-A885-4BE3-A3E7-6D5BEEA58F35}</a:tableStyleId>
               </a:tblPr>
               <a:tblGrid>
-                <a:gridCol w="578046">
+                <a:gridCol w="551940">
                   <a:extLst>
                     <a:ext uri="{9D8B030D-6E8A-4147-A177-3AD203B41FA5}">
                       <a16:colId xmlns:a16="http://schemas.microsoft.com/office/drawing/2014/main" val="3391576538"/>
                     </a:ext>
                   </a:extLst>
                 </a:gridCol>
-                <a:gridCol w="1284269">
+                <a:gridCol w="1420483">
                   <a:extLst>
                     <a:ext uri="{9D8B030D-6E8A-4147-A177-3AD203B41FA5}">
                       <a16:colId xmlns:a16="http://schemas.microsoft.com/office/drawing/2014/main" val="2984259512"/>
                     </a:ext>
                   </a:extLst>
                 </a:gridCol>
-                <a:gridCol w="647272">
+                <a:gridCol w="678612">
                   <a:extLst>
                     <a:ext uri="{9D8B030D-6E8A-4147-A177-3AD203B41FA5}">
                       <a16:colId xmlns:a16="http://schemas.microsoft.com/office/drawing/2014/main" val="1074914621"/>
                     </a:ext>
                   </a:extLst>
                 </a:gridCol>
-                <a:gridCol w="601038">
+                <a:gridCol w="736120">
                   <a:extLst>
                     <a:ext uri="{9D8B030D-6E8A-4147-A177-3AD203B41FA5}">
-                      <a16:colId xmlns:a16="http://schemas.microsoft.com/office/drawing/2014/main" val="3212216933"/>
+                      <a16:colId xmlns:a16="http://schemas.microsoft.com/office/drawing/2014/main" val="2666699343"/>
                     </a:ext>
                   </a:extLst>
                 </a:gridCol>
-                <a:gridCol w="821610">
+                <a:gridCol w="845389">
                   <a:extLst>
                     <a:ext uri="{9D8B030D-6E8A-4147-A177-3AD203B41FA5}">
-                      <a16:colId xmlns:a16="http://schemas.microsoft.com/office/drawing/2014/main" val="2443457955"/>
+                      <a16:colId xmlns:a16="http://schemas.microsoft.com/office/drawing/2014/main" val="2212966170"/>
                     </a:ext>
                   </a:extLst>
                 </a:gridCol>
               </a:tblGrid>
-              <a:tr h="427489">
+              <a:tr h="698867">
                 <a:tc>
                   <a:txBody>
                     <a:bodyPr/>
                     <a:lstStyle/>
                     <a:p>
+                      <a:pPr algn="ctr"/>
                       <a:r>
                         <a:rPr lang="en-US" sz="1200" dirty="0"/>
-                        <a:t>Rank</a:t>
+                        <a:t>Year</a:t>
                       </a:r>
                     </a:p>
                   </a:txBody>
@@ -6954,6 +8806,7 @@
                     <a:bodyPr/>
                     <a:lstStyle/>
                     <a:p>
+                      <a:pPr algn="ctr"/>
                       <a:r>
                         <a:rPr lang="en-US" sz="1200" dirty="0"/>
                         <a:t>City</a:t>
@@ -6967,9 +8820,10 @@
                     <a:bodyPr/>
                     <a:lstStyle/>
                     <a:p>
+                      <a:pPr algn="ctr"/>
                       <a:r>
                         <a:rPr lang="en-US" sz="1200" dirty="0"/>
-                        <a:t>Hours</a:t>
+                        <a:t>Million Hours</a:t>
                       </a:r>
                     </a:p>
                   </a:txBody>
@@ -6980,6 +8834,7 @@
                     <a:bodyPr/>
                     <a:lstStyle/>
                     <a:p>
+                      <a:pPr algn="ctr"/>
                       <a:r>
                         <a:rPr lang="en-US" sz="1200" dirty="0"/>
                         <a:t>Site</a:t>
@@ -6993,9 +8848,10 @@
                     <a:bodyPr/>
                     <a:lstStyle/>
                     <a:p>
+                      <a:pPr algn="ctr"/>
                       <a:r>
                         <a:rPr lang="en-US" sz="1200" dirty="0"/>
-                        <a:t>Avg Duration</a:t>
+                        <a:t>Avg. Distance (miles)</a:t>
                       </a:r>
                     </a:p>
                   </a:txBody>
@@ -7007,7 +8863,7 @@
                   </a:ext>
                 </a:extLst>
               </a:tr>
-              <a:tr h="402961">
+              <a:tr h="470117">
                 <a:tc>
                   <a:txBody>
                     <a:bodyPr/>
@@ -7015,7 +8871,7 @@
                     <a:p>
                       <a:r>
                         <a:rPr lang="en-US" sz="1200" dirty="0"/>
-                        <a:t>1</a:t>
+                        <a:t>2016</a:t>
                       </a:r>
                     </a:p>
                   </a:txBody>
@@ -7026,7 +8882,10 @@
                     <a:bodyPr/>
                     <a:lstStyle/>
                     <a:p>
-                      <a:endParaRPr lang="en-US" sz="1200" dirty="0"/>
+                      <a:r>
+                        <a:rPr lang="en-US" sz="1200" dirty="0"/>
+                        <a:t>Middletown, DE</a:t>
+                      </a:r>
                     </a:p>
                   </a:txBody>
                   <a:tcPr/>
@@ -7036,7 +8895,11 @@
                     <a:bodyPr/>
                     <a:lstStyle/>
                     <a:p>
-                      <a:endParaRPr lang="en-US" sz="1200" dirty="0"/>
+                      <a:pPr algn="l"/>
+                      <a:r>
+                        <a:rPr lang="en-US" sz="1200" dirty="0"/>
+                        <a:t>10.4</a:t>
+                      </a:r>
                     </a:p>
                   </a:txBody>
                   <a:tcPr/>
@@ -7046,7 +8909,10 @@
                     <a:bodyPr/>
                     <a:lstStyle/>
                     <a:p>
-                      <a:endParaRPr lang="en-US" sz="1200" dirty="0"/>
+                      <a:r>
+                        <a:rPr lang="en-US" sz="1200" dirty="0"/>
+                        <a:t>299</a:t>
+                      </a:r>
                     </a:p>
                   </a:txBody>
                   <a:tcPr/>
@@ -7056,7 +8922,186 @@
                     <a:bodyPr/>
                     <a:lstStyle/>
                     <a:p>
-                      <a:endParaRPr lang="en-US" sz="1200" dirty="0"/>
+                      <a:r>
+                        <a:rPr lang="en-US" sz="1200" dirty="0"/>
+                        <a:t>0.9</a:t>
+                      </a:r>
+                    </a:p>
+                  </a:txBody>
+                  <a:tcPr/>
+                </a:tc>
+                <a:extLst>
+                  <a:ext uri="{0D108BD9-81ED-4DB2-BD59-A6C34878D82A}">
+                    <a16:rowId xmlns:a16="http://schemas.microsoft.com/office/drawing/2014/main" val="311845754"/>
+                  </a:ext>
+                </a:extLst>
+              </a:tr>
+              <a:tr h="427443">
+                <a:tc>
+                  <a:txBody>
+                    <a:bodyPr/>
+                    <a:lstStyle/>
+                    <a:p>
+                      <a:r>
+                        <a:rPr lang="en-US" sz="1200" dirty="0"/>
+                        <a:t>2017</a:t>
+                      </a:r>
+                    </a:p>
+                  </a:txBody>
+                  <a:tcPr/>
+                </a:tc>
+                <a:tc>
+                  <a:txBody>
+                    <a:bodyPr/>
+                    <a:lstStyle/>
+                    <a:p>
+                      <a:pPr marL="0" algn="l" defTabSz="914400" rtl="0" eaLnBrk="1" latinLnBrk="0" hangingPunct="1"/>
+                      <a:r>
+                        <a:rPr lang="en-US" sz="1200" kern="1200" dirty="0">
+                          <a:solidFill>
+                            <a:schemeClr val="dk1"/>
+                          </a:solidFill>
+                          <a:latin typeface="+mn-lt"/>
+                          <a:ea typeface="+mn-ea"/>
+                          <a:cs typeface="+mn-cs"/>
+                        </a:rPr>
+                        <a:t>York, PA</a:t>
+                      </a:r>
+                    </a:p>
+                  </a:txBody>
+                  <a:tcPr/>
+                </a:tc>
+                <a:tc>
+                  <a:txBody>
+                    <a:bodyPr/>
+                    <a:lstStyle/>
+                    <a:p>
+                      <a:pPr marL="0" algn="l" defTabSz="914400" rtl="0" eaLnBrk="1" latinLnBrk="0" hangingPunct="1"/>
+                      <a:r>
+                        <a:rPr lang="en-US" sz="1200" kern="1200" dirty="0">
+                          <a:solidFill>
+                            <a:schemeClr val="dk1"/>
+                          </a:solidFill>
+                          <a:latin typeface="+mn-lt"/>
+                          <a:ea typeface="+mn-ea"/>
+                          <a:cs typeface="+mn-cs"/>
+                        </a:rPr>
+                        <a:t>10.3</a:t>
+                      </a:r>
+                    </a:p>
+                  </a:txBody>
+                  <a:tcPr/>
+                </a:tc>
+                <a:tc>
+                  <a:txBody>
+                    <a:bodyPr/>
+                    <a:lstStyle/>
+                    <a:p>
+                      <a:r>
+                        <a:rPr lang="en-US" sz="1200" dirty="0"/>
+                        <a:t>841</a:t>
+                      </a:r>
+                    </a:p>
+                  </a:txBody>
+                  <a:tcPr/>
+                </a:tc>
+                <a:tc>
+                  <a:txBody>
+                    <a:bodyPr/>
+                    <a:lstStyle/>
+                    <a:p>
+                      <a:r>
+                        <a:rPr lang="en-US" sz="1200" dirty="0"/>
+                        <a:t>1.8</a:t>
+                      </a:r>
+                    </a:p>
+                  </a:txBody>
+                  <a:tcPr/>
+                </a:tc>
+                <a:extLst>
+                  <a:ext uri="{0D108BD9-81ED-4DB2-BD59-A6C34878D82A}">
+                    <a16:rowId xmlns:a16="http://schemas.microsoft.com/office/drawing/2014/main" val="4126308289"/>
+                  </a:ext>
+                </a:extLst>
+              </a:tr>
+              <a:tr h="427443">
+                <a:tc>
+                  <a:txBody>
+                    <a:bodyPr/>
+                    <a:lstStyle/>
+                    <a:p>
+                      <a:r>
+                        <a:rPr lang="en-US" sz="1200" dirty="0"/>
+                        <a:t>2018</a:t>
+                      </a:r>
+                    </a:p>
+                  </a:txBody>
+                  <a:tcPr/>
+                </a:tc>
+                <a:tc>
+                  <a:txBody>
+                    <a:bodyPr/>
+                    <a:lstStyle/>
+                    <a:p>
+                      <a:pPr marL="0" algn="l" defTabSz="914400" rtl="0" eaLnBrk="1" latinLnBrk="0" hangingPunct="1"/>
+                      <a:r>
+                        <a:rPr lang="en-US" sz="1200" kern="1200" dirty="0">
+                          <a:solidFill>
+                            <a:schemeClr val="dk1"/>
+                          </a:solidFill>
+                          <a:latin typeface="+mn-lt"/>
+                          <a:ea typeface="+mn-ea"/>
+                          <a:cs typeface="+mn-cs"/>
+                        </a:rPr>
+                        <a:t>Winnfield, LA</a:t>
+                      </a:r>
+                    </a:p>
+                  </a:txBody>
+                  <a:tcPr marL="50800" marR="50800" marT="25400" marB="25400"/>
+                </a:tc>
+                <a:tc>
+                  <a:txBody>
+                    <a:bodyPr/>
+                    <a:lstStyle/>
+                    <a:p>
+                      <a:pPr marL="0" algn="l" defTabSz="914400" rtl="0" eaLnBrk="1" latinLnBrk="0" hangingPunct="1"/>
+                      <a:r>
+                        <a:rPr lang="en-US" sz="1200" kern="1200" dirty="0">
+                          <a:solidFill>
+                            <a:schemeClr val="dk1"/>
+                          </a:solidFill>
+                          <a:latin typeface="+mn-lt"/>
+                          <a:ea typeface="+mn-ea"/>
+                          <a:cs typeface="+mn-cs"/>
+                        </a:rPr>
+                        <a:t>9.8</a:t>
+                      </a:r>
+                    </a:p>
+                  </a:txBody>
+                  <a:tcPr/>
+                </a:tc>
+                <a:tc>
+                  <a:txBody>
+                    <a:bodyPr/>
+                    <a:lstStyle/>
+                    <a:p>
+                      <a:r>
+                        <a:rPr lang="en-US" sz="1200" dirty="0"/>
+                        <a:t>461</a:t>
+                      </a:r>
+                    </a:p>
+                  </a:txBody>
+                  <a:tcPr/>
+                </a:tc>
+                <a:tc>
+                  <a:txBody>
+                    <a:bodyPr/>
+                    <a:lstStyle/>
+                    <a:p>
+                      <a:r>
+                        <a:rPr lang="en-US" sz="1200" dirty="0"/>
+                        <a:t>1.9</a:t>
+                      </a:r>
                     </a:p>
                   </a:txBody>
                   <a:tcPr/>
@@ -7067,7 +9112,7 @@
                   </a:ext>
                 </a:extLst>
               </a:tr>
-              <a:tr h="402961">
+              <a:tr h="470117">
                 <a:tc>
                   <a:txBody>
                     <a:bodyPr/>
@@ -7075,7 +9120,7 @@
                     <a:p>
                       <a:r>
                         <a:rPr lang="en-US" sz="1200" dirty="0"/>
-                        <a:t>2</a:t>
+                        <a:t>2019</a:t>
                       </a:r>
                     </a:p>
                   </a:txBody>
@@ -7086,56 +9131,17 @@
                     <a:bodyPr/>
                     <a:lstStyle/>
                     <a:p>
-                      <a:endParaRPr lang="en-US" sz="1200"/>
-                    </a:p>
-                  </a:txBody>
-                  <a:tcPr/>
-                </a:tc>
-                <a:tc>
-                  <a:txBody>
-                    <a:bodyPr/>
-                    <a:lstStyle/>
-                    <a:p>
-                      <a:endParaRPr lang="en-US" sz="1200" dirty="0"/>
-                    </a:p>
-                  </a:txBody>
-                  <a:tcPr/>
-                </a:tc>
-                <a:tc>
-                  <a:txBody>
-                    <a:bodyPr/>
-                    <a:lstStyle/>
-                    <a:p>
-                      <a:endParaRPr lang="en-US" sz="1200" dirty="0"/>
-                    </a:p>
-                  </a:txBody>
-                  <a:tcPr/>
-                </a:tc>
-                <a:tc>
-                  <a:txBody>
-                    <a:bodyPr/>
-                    <a:lstStyle/>
-                    <a:p>
-                      <a:endParaRPr lang="en-US" sz="1200" dirty="0"/>
-                    </a:p>
-                  </a:txBody>
-                  <a:tcPr/>
-                </a:tc>
-                <a:extLst>
-                  <a:ext uri="{0D108BD9-81ED-4DB2-BD59-A6C34878D82A}">
-                    <a16:rowId xmlns:a16="http://schemas.microsoft.com/office/drawing/2014/main" val="1210548830"/>
-                  </a:ext>
-                </a:extLst>
-              </a:tr>
-              <a:tr h="402961">
-                <a:tc>
-                  <a:txBody>
-                    <a:bodyPr/>
-                    <a:lstStyle/>
-                    <a:p>
+                      <a:pPr marL="0" algn="l" defTabSz="914400" rtl="0" eaLnBrk="1" latinLnBrk="0" hangingPunct="1"/>
                       <a:r>
-                        <a:rPr lang="en-US" sz="1200" dirty="0"/>
-                        <a:t>3</a:t>
+                        <a:rPr lang="en-US" sz="1200" kern="1200" dirty="0">
+                          <a:solidFill>
+                            <a:schemeClr val="dk1"/>
+                          </a:solidFill>
+                          <a:latin typeface="+mn-lt"/>
+                          <a:ea typeface="+mn-ea"/>
+                          <a:cs typeface="+mn-cs"/>
+                        </a:rPr>
+                        <a:t>Cle Elum, WA</a:t>
                       </a:r>
                     </a:p>
                   </a:txBody>
@@ -7146,7 +9152,18 @@
                     <a:bodyPr/>
                     <a:lstStyle/>
                     <a:p>
-                      <a:endParaRPr lang="en-US" sz="1200"/>
+                      <a:pPr marL="0" algn="l" defTabSz="914400" rtl="0" eaLnBrk="1" latinLnBrk="0" hangingPunct="1"/>
+                      <a:r>
+                        <a:rPr lang="en-US" sz="1200" b="1" kern="1200" dirty="0">
+                          <a:solidFill>
+                            <a:schemeClr val="dk1"/>
+                          </a:solidFill>
+                          <a:latin typeface="+mn-lt"/>
+                          <a:ea typeface="+mn-ea"/>
+                          <a:cs typeface="+mn-cs"/>
+                        </a:rPr>
+                        <a:t>17.8</a:t>
+                      </a:r>
                     </a:p>
                   </a:txBody>
                   <a:tcPr/>
@@ -7156,7 +9173,10 @@
                     <a:bodyPr/>
                     <a:lstStyle/>
                     <a:p>
-                      <a:endParaRPr lang="en-US" sz="1200" dirty="0"/>
+                      <a:r>
+                        <a:rPr lang="en-US" sz="1200" dirty="0"/>
+                        <a:t>1,393</a:t>
+                      </a:r>
                     </a:p>
                   </a:txBody>
                   <a:tcPr/>
@@ -7166,17 +9186,10 @@
                     <a:bodyPr/>
                     <a:lstStyle/>
                     <a:p>
-                      <a:endParaRPr lang="en-US" sz="1200" dirty="0"/>
-                    </a:p>
-                  </a:txBody>
-                  <a:tcPr/>
-                </a:tc>
-                <a:tc>
-                  <a:txBody>
-                    <a:bodyPr/>
-                    <a:lstStyle/>
-                    <a:p>
-                      <a:endParaRPr lang="en-US" sz="1200" dirty="0"/>
+                      <a:r>
+                        <a:rPr lang="en-US" sz="1200" b="1" dirty="0"/>
+                        <a:t>4.0</a:t>
+                      </a:r>
                     </a:p>
                   </a:txBody>
                   <a:tcPr/>
@@ -7187,7 +9200,7 @@
                   </a:ext>
                 </a:extLst>
               </a:tr>
-              <a:tr h="402961">
+              <a:tr h="427443">
                 <a:tc>
                   <a:txBody>
                     <a:bodyPr/>
@@ -7195,7 +9208,7 @@
                     <a:p>
                       <a:r>
                         <a:rPr lang="en-US" sz="1200" dirty="0"/>
-                        <a:t>4</a:t>
+                        <a:t>2020</a:t>
                       </a:r>
                     </a:p>
                   </a:txBody>
@@ -7206,7 +9219,18 @@
                     <a:bodyPr/>
                     <a:lstStyle/>
                     <a:p>
-                      <a:endParaRPr lang="en-US" sz="1200" dirty="0"/>
+                      <a:pPr marL="0" algn="l" defTabSz="914400" rtl="0" eaLnBrk="1" latinLnBrk="0" hangingPunct="1"/>
+                      <a:r>
+                        <a:rPr lang="en-US" sz="1200" b="1" kern="1200" dirty="0">
+                          <a:solidFill>
+                            <a:schemeClr val="dk1"/>
+                          </a:solidFill>
+                          <a:latin typeface="+mn-lt"/>
+                          <a:ea typeface="+mn-ea"/>
+                          <a:cs typeface="+mn-cs"/>
+                        </a:rPr>
+                        <a:t>Phoenix, AZ</a:t>
+                      </a:r>
                     </a:p>
                   </a:txBody>
                   <a:tcPr/>
@@ -7216,7 +9240,18 @@
                     <a:bodyPr/>
                     <a:lstStyle/>
                     <a:p>
-                      <a:endParaRPr lang="en-US" sz="1200" dirty="0"/>
+                      <a:pPr marL="0" algn="l" defTabSz="914400" rtl="0" eaLnBrk="1" latinLnBrk="0" hangingPunct="1"/>
+                      <a:r>
+                        <a:rPr lang="en-US" sz="1200" kern="1200" dirty="0">
+                          <a:solidFill>
+                            <a:schemeClr val="dk1"/>
+                          </a:solidFill>
+                          <a:latin typeface="+mn-lt"/>
+                          <a:ea typeface="+mn-ea"/>
+                          <a:cs typeface="+mn-cs"/>
+                        </a:rPr>
+                        <a:t>11.9</a:t>
+                      </a:r>
                     </a:p>
                   </a:txBody>
                   <a:tcPr/>
@@ -7226,7 +9261,10 @@
                     <a:bodyPr/>
                     <a:lstStyle/>
                     <a:p>
-                      <a:endParaRPr lang="en-US" sz="1200" dirty="0"/>
+                      <a:r>
+                        <a:rPr lang="en-US" sz="1200" dirty="0"/>
+                        <a:t>34,240</a:t>
+                      </a:r>
                     </a:p>
                   </a:txBody>
                   <a:tcPr/>
@@ -7236,7 +9274,10 @@
                     <a:bodyPr/>
                     <a:lstStyle/>
                     <a:p>
-                      <a:endParaRPr lang="en-US" sz="1200" dirty="0"/>
+                      <a:r>
+                        <a:rPr lang="en-US" sz="1200" dirty="0"/>
+                        <a:t>0.2</a:t>
+                      </a:r>
                     </a:p>
                   </a:txBody>
                   <a:tcPr/>
@@ -7247,7 +9288,7 @@
                   </a:ext>
                 </a:extLst>
               </a:tr>
-              <a:tr h="402961">
+              <a:tr h="427443">
                 <a:tc>
                   <a:txBody>
                     <a:bodyPr/>
@@ -7255,7 +9296,7 @@
                     <a:p>
                       <a:r>
                         <a:rPr lang="en-US" sz="1200" dirty="0"/>
-                        <a:t>5</a:t>
+                        <a:t>2021</a:t>
                       </a:r>
                     </a:p>
                   </a:txBody>
@@ -7266,7 +9307,18 @@
                     <a:bodyPr/>
                     <a:lstStyle/>
                     <a:p>
-                      <a:endParaRPr lang="en-US" sz="1200"/>
+                      <a:pPr marL="0" algn="l" defTabSz="914400" rtl="0" eaLnBrk="1" latinLnBrk="0" hangingPunct="1"/>
+                      <a:r>
+                        <a:rPr lang="en-US" sz="1200" b="1" kern="1200" dirty="0">
+                          <a:solidFill>
+                            <a:schemeClr val="dk1"/>
+                          </a:solidFill>
+                          <a:latin typeface="+mn-lt"/>
+                          <a:ea typeface="+mn-ea"/>
+                          <a:cs typeface="+mn-cs"/>
+                        </a:rPr>
+                        <a:t>Phoenix, AZ</a:t>
+                      </a:r>
                     </a:p>
                   </a:txBody>
                   <a:tcPr/>
@@ -7276,7 +9328,18 @@
                     <a:bodyPr/>
                     <a:lstStyle/>
                     <a:p>
-                      <a:endParaRPr lang="en-US" sz="1200" dirty="0"/>
+                      <a:pPr marL="0" algn="l" defTabSz="914400" rtl="0" eaLnBrk="1" latinLnBrk="0" hangingPunct="1"/>
+                      <a:r>
+                        <a:rPr lang="en-US" sz="1200" kern="1200" dirty="0">
+                          <a:solidFill>
+                            <a:schemeClr val="dk1"/>
+                          </a:solidFill>
+                          <a:latin typeface="+mn-lt"/>
+                          <a:ea typeface="+mn-ea"/>
+                          <a:cs typeface="+mn-cs"/>
+                        </a:rPr>
+                        <a:t>10.3</a:t>
+                      </a:r>
                     </a:p>
                   </a:txBody>
                   <a:tcPr/>
@@ -7286,7 +9349,10 @@
                     <a:bodyPr/>
                     <a:lstStyle/>
                     <a:p>
-                      <a:endParaRPr lang="en-US" sz="1200" dirty="0"/>
+                      <a:r>
+                        <a:rPr lang="en-US" sz="1200" b="1" dirty="0"/>
+                        <a:t>212,356</a:t>
+                      </a:r>
                     </a:p>
                   </a:txBody>
                   <a:tcPr/>
@@ -7296,7 +9362,10 @@
                     <a:bodyPr/>
                     <a:lstStyle/>
                     <a:p>
-                      <a:endParaRPr lang="en-US" sz="1200" dirty="0"/>
+                      <a:r>
+                        <a:rPr lang="en-US" sz="1200" dirty="0"/>
+                        <a:t>0.2</a:t>
+                      </a:r>
                     </a:p>
                   </a:txBody>
                   <a:tcPr/>
@@ -7311,36 +9380,486 @@
           </a:graphicData>
         </a:graphic>
       </p:graphicFrame>
-      <p:pic>
-        <p:nvPicPr>
-          <p:cNvPr id="6" name="Picture 5">
-            <a:extLst>
-              <a:ext uri="{FF2B5EF4-FFF2-40B4-BE49-F238E27FC236}">
-                <a16:creationId xmlns:a16="http://schemas.microsoft.com/office/drawing/2014/main" id="{A7E1D141-1C72-C4FE-32FC-B4DA3CF5497F}"/>
-              </a:ext>
-            </a:extLst>
-          </p:cNvPr>
-          <p:cNvPicPr>
-            <a:picLocks noChangeAspect="1"/>
-          </p:cNvPicPr>
+      <p:sp>
+        <p:nvSpPr>
+          <p:cNvPr id="8" name="Text Placeholder 3">
+            <a:extLst>
+              <a:ext uri="{FF2B5EF4-FFF2-40B4-BE49-F238E27FC236}">
+                <a16:creationId xmlns:a16="http://schemas.microsoft.com/office/drawing/2014/main" id="{FEDB8683-4134-3642-3A7B-2073A14FBB5C}"/>
+              </a:ext>
+            </a:extLst>
+          </p:cNvPr>
+          <p:cNvSpPr txBox="1">
+            <a:spLocks/>
+          </p:cNvSpPr>
           <p:nvPr/>
-        </p:nvPicPr>
-        <p:blipFill>
-          <a:blip r:embed="rId2"/>
-          <a:stretch>
-            <a:fillRect/>
-          </a:stretch>
-        </p:blipFill>
+        </p:nvSpPr>
         <p:spPr>
           <a:xfrm>
-            <a:off x="5609033" y="1826616"/>
-            <a:ext cx="6013874" cy="3587650"/>
+            <a:off x="839788" y="5787275"/>
+            <a:ext cx="4232544" cy="782726"/>
           </a:xfrm>
           <a:prstGeom prst="rect">
             <a:avLst/>
           </a:prstGeom>
+          <a:solidFill>
+            <a:schemeClr val="accent4">
+              <a:alpha val="50000"/>
+            </a:schemeClr>
+          </a:solidFill>
         </p:spPr>
-      </p:pic>
+        <p:style>
+          <a:lnRef idx="0">
+            <a:scrgbClr r="0" g="0" b="0"/>
+          </a:lnRef>
+          <a:fillRef idx="0">
+            <a:scrgbClr r="0" g="0" b="0"/>
+          </a:fillRef>
+          <a:effectRef idx="0">
+            <a:scrgbClr r="0" g="0" b="0"/>
+          </a:effectRef>
+          <a:fontRef idx="minor">
+            <a:schemeClr val="lt1"/>
+          </a:fontRef>
+        </p:style>
+        <p:txBody>
+          <a:bodyPr vert="horz" lIns="91440" tIns="45720" rIns="91440" bIns="45720" rtlCol="0">
+            <a:normAutofit fontScale="92500" lnSpcReduction="10000"/>
+          </a:bodyPr>
+          <a:lstStyle>
+            <a:lvl1pPr marL="0" indent="0" algn="l" defTabSz="914400" rtl="0" eaLnBrk="1" latinLnBrk="0" hangingPunct="1">
+              <a:lnSpc>
+                <a:spcPct val="90000"/>
+              </a:lnSpc>
+              <a:spcBef>
+                <a:spcPts val="1000"/>
+              </a:spcBef>
+              <a:buFont typeface="Arial" panose="020B0604020202020204" pitchFamily="34" charset="0"/>
+              <a:buNone/>
+              <a:defRPr sz="1600" kern="1200">
+                <a:solidFill>
+                  <a:schemeClr val="lt1"/>
+                </a:solidFill>
+                <a:latin typeface="+mn-lt"/>
+                <a:ea typeface="+mn-ea"/>
+                <a:cs typeface="+mn-cs"/>
+              </a:defRPr>
+            </a:lvl1pPr>
+            <a:lvl2pPr marL="457200" indent="0" algn="l" defTabSz="914400" rtl="0" eaLnBrk="1" latinLnBrk="0" hangingPunct="1">
+              <a:lnSpc>
+                <a:spcPct val="90000"/>
+              </a:lnSpc>
+              <a:spcBef>
+                <a:spcPts val="500"/>
+              </a:spcBef>
+              <a:buFont typeface="Arial" panose="020B0604020202020204" pitchFamily="34" charset="0"/>
+              <a:buNone/>
+              <a:defRPr sz="1400" kern="1200">
+                <a:solidFill>
+                  <a:schemeClr val="lt1"/>
+                </a:solidFill>
+                <a:latin typeface="+mn-lt"/>
+                <a:ea typeface="+mn-ea"/>
+                <a:cs typeface="+mn-cs"/>
+              </a:defRPr>
+            </a:lvl2pPr>
+            <a:lvl3pPr marL="914400" indent="0" algn="l" defTabSz="914400" rtl="0" eaLnBrk="1" latinLnBrk="0" hangingPunct="1">
+              <a:lnSpc>
+                <a:spcPct val="90000"/>
+              </a:lnSpc>
+              <a:spcBef>
+                <a:spcPts val="500"/>
+              </a:spcBef>
+              <a:buFont typeface="Arial" panose="020B0604020202020204" pitchFamily="34" charset="0"/>
+              <a:buNone/>
+              <a:defRPr sz="1200" kern="1200">
+                <a:solidFill>
+                  <a:schemeClr val="lt1"/>
+                </a:solidFill>
+                <a:latin typeface="+mn-lt"/>
+                <a:ea typeface="+mn-ea"/>
+                <a:cs typeface="+mn-cs"/>
+              </a:defRPr>
+            </a:lvl3pPr>
+            <a:lvl4pPr marL="1371600" indent="0" algn="l" defTabSz="914400" rtl="0" eaLnBrk="1" latinLnBrk="0" hangingPunct="1">
+              <a:lnSpc>
+                <a:spcPct val="90000"/>
+              </a:lnSpc>
+              <a:spcBef>
+                <a:spcPts val="500"/>
+              </a:spcBef>
+              <a:buFont typeface="Arial" panose="020B0604020202020204" pitchFamily="34" charset="0"/>
+              <a:buNone/>
+              <a:defRPr sz="1000" kern="1200">
+                <a:solidFill>
+                  <a:schemeClr val="lt1"/>
+                </a:solidFill>
+                <a:latin typeface="+mn-lt"/>
+                <a:ea typeface="+mn-ea"/>
+                <a:cs typeface="+mn-cs"/>
+              </a:defRPr>
+            </a:lvl4pPr>
+            <a:lvl5pPr marL="1828800" indent="0" algn="l" defTabSz="914400" rtl="0" eaLnBrk="1" latinLnBrk="0" hangingPunct="1">
+              <a:lnSpc>
+                <a:spcPct val="90000"/>
+              </a:lnSpc>
+              <a:spcBef>
+                <a:spcPts val="500"/>
+              </a:spcBef>
+              <a:buFont typeface="Arial" panose="020B0604020202020204" pitchFamily="34" charset="0"/>
+              <a:buNone/>
+              <a:defRPr sz="1000" kern="1200">
+                <a:solidFill>
+                  <a:schemeClr val="lt1"/>
+                </a:solidFill>
+                <a:latin typeface="+mn-lt"/>
+                <a:ea typeface="+mn-ea"/>
+                <a:cs typeface="+mn-cs"/>
+              </a:defRPr>
+            </a:lvl5pPr>
+            <a:lvl6pPr marL="2286000" indent="0" algn="l" defTabSz="914400" rtl="0" eaLnBrk="1" latinLnBrk="0" hangingPunct="1">
+              <a:lnSpc>
+                <a:spcPct val="90000"/>
+              </a:lnSpc>
+              <a:spcBef>
+                <a:spcPts val="500"/>
+              </a:spcBef>
+              <a:buFont typeface="Arial" panose="020B0604020202020204" pitchFamily="34" charset="0"/>
+              <a:buNone/>
+              <a:defRPr sz="1000" kern="1200">
+                <a:solidFill>
+                  <a:schemeClr val="lt1"/>
+                </a:solidFill>
+                <a:latin typeface="+mn-lt"/>
+                <a:ea typeface="+mn-ea"/>
+                <a:cs typeface="+mn-cs"/>
+              </a:defRPr>
+            </a:lvl6pPr>
+            <a:lvl7pPr marL="2743200" indent="0" algn="l" defTabSz="914400" rtl="0" eaLnBrk="1" latinLnBrk="0" hangingPunct="1">
+              <a:lnSpc>
+                <a:spcPct val="90000"/>
+              </a:lnSpc>
+              <a:spcBef>
+                <a:spcPts val="500"/>
+              </a:spcBef>
+              <a:buFont typeface="Arial" panose="020B0604020202020204" pitchFamily="34" charset="0"/>
+              <a:buNone/>
+              <a:defRPr sz="1000" kern="1200">
+                <a:solidFill>
+                  <a:schemeClr val="lt1"/>
+                </a:solidFill>
+                <a:latin typeface="+mn-lt"/>
+                <a:ea typeface="+mn-ea"/>
+                <a:cs typeface="+mn-cs"/>
+              </a:defRPr>
+            </a:lvl7pPr>
+            <a:lvl8pPr marL="3200400" indent="0" algn="l" defTabSz="914400" rtl="0" eaLnBrk="1" latinLnBrk="0" hangingPunct="1">
+              <a:lnSpc>
+                <a:spcPct val="90000"/>
+              </a:lnSpc>
+              <a:spcBef>
+                <a:spcPts val="500"/>
+              </a:spcBef>
+              <a:buFont typeface="Arial" panose="020B0604020202020204" pitchFamily="34" charset="0"/>
+              <a:buNone/>
+              <a:defRPr sz="1000" kern="1200">
+                <a:solidFill>
+                  <a:schemeClr val="lt1"/>
+                </a:solidFill>
+                <a:latin typeface="+mn-lt"/>
+                <a:ea typeface="+mn-ea"/>
+                <a:cs typeface="+mn-cs"/>
+              </a:defRPr>
+            </a:lvl8pPr>
+            <a:lvl9pPr marL="3657600" indent="0" algn="l" defTabSz="914400" rtl="0" eaLnBrk="1" latinLnBrk="0" hangingPunct="1">
+              <a:lnSpc>
+                <a:spcPct val="90000"/>
+              </a:lnSpc>
+              <a:spcBef>
+                <a:spcPts val="500"/>
+              </a:spcBef>
+              <a:buFont typeface="Arial" panose="020B0604020202020204" pitchFamily="34" charset="0"/>
+              <a:buNone/>
+              <a:defRPr sz="1000" kern="1200">
+                <a:solidFill>
+                  <a:schemeClr val="lt1"/>
+                </a:solidFill>
+                <a:latin typeface="+mn-lt"/>
+                <a:ea typeface="+mn-ea"/>
+                <a:cs typeface="+mn-cs"/>
+              </a:defRPr>
+            </a:lvl9pPr>
+          </a:lstStyle>
+          <a:p>
+            <a:pPr marL="285750" indent="-285750">
+              <a:buFont typeface="Arial" panose="020B0604020202020204" pitchFamily="34" charset="0"/>
+              <a:buChar char="•"/>
+            </a:pPr>
+            <a:r>
+              <a:rPr lang="en-US" b="1" dirty="0">
+                <a:solidFill>
+                  <a:schemeClr val="accent1"/>
+                </a:solidFill>
+              </a:rPr>
+              <a:t>Phoenix has higher construction site with shorter length</a:t>
+            </a:r>
+          </a:p>
+          <a:p>
+            <a:pPr marL="285750" indent="-285750">
+              <a:buFont typeface="Arial" panose="020B0604020202020204" pitchFamily="34" charset="0"/>
+              <a:buChar char="•"/>
+            </a:pPr>
+            <a:r>
+              <a:rPr lang="en-US" b="1" dirty="0">
+                <a:solidFill>
+                  <a:schemeClr val="accent1"/>
+                </a:solidFill>
+              </a:rPr>
+              <a:t>Cle Elum has long stretched sites</a:t>
+            </a:r>
+          </a:p>
+        </p:txBody>
+      </p:sp>
+      <p:sp>
+        <p:nvSpPr>
+          <p:cNvPr id="9" name="Text Placeholder 3">
+            <a:extLst>
+              <a:ext uri="{FF2B5EF4-FFF2-40B4-BE49-F238E27FC236}">
+                <a16:creationId xmlns:a16="http://schemas.microsoft.com/office/drawing/2014/main" id="{D4CA404D-F850-E4BB-E67A-CD805511CBD2}"/>
+              </a:ext>
+            </a:extLst>
+          </p:cNvPr>
+          <p:cNvSpPr txBox="1">
+            <a:spLocks/>
+          </p:cNvSpPr>
+          <p:nvPr/>
+        </p:nvSpPr>
+        <p:spPr>
+          <a:xfrm>
+            <a:off x="7571267" y="1747689"/>
+            <a:ext cx="4232544" cy="1047269"/>
+          </a:xfrm>
+          <a:prstGeom prst="rect">
+            <a:avLst/>
+          </a:prstGeom>
+          <a:solidFill>
+            <a:schemeClr val="accent4">
+              <a:alpha val="50000"/>
+            </a:schemeClr>
+          </a:solidFill>
+        </p:spPr>
+        <p:style>
+          <a:lnRef idx="0">
+            <a:scrgbClr r="0" g="0" b="0"/>
+          </a:lnRef>
+          <a:fillRef idx="0">
+            <a:scrgbClr r="0" g="0" b="0"/>
+          </a:fillRef>
+          <a:effectRef idx="0">
+            <a:scrgbClr r="0" g="0" b="0"/>
+          </a:effectRef>
+          <a:fontRef idx="minor">
+            <a:schemeClr val="lt1"/>
+          </a:fontRef>
+        </p:style>
+        <p:txBody>
+          <a:bodyPr vert="horz" lIns="91440" tIns="45720" rIns="91440" bIns="45720" rtlCol="0">
+            <a:normAutofit lnSpcReduction="10000"/>
+          </a:bodyPr>
+          <a:lstStyle>
+            <a:lvl1pPr marL="0" indent="0" algn="l" defTabSz="914400" rtl="0" eaLnBrk="1" latinLnBrk="0" hangingPunct="1">
+              <a:lnSpc>
+                <a:spcPct val="90000"/>
+              </a:lnSpc>
+              <a:spcBef>
+                <a:spcPts val="1000"/>
+              </a:spcBef>
+              <a:buFont typeface="Arial" panose="020B0604020202020204" pitchFamily="34" charset="0"/>
+              <a:buNone/>
+              <a:defRPr sz="1600" kern="1200">
+                <a:solidFill>
+                  <a:schemeClr val="lt1"/>
+                </a:solidFill>
+                <a:latin typeface="+mn-lt"/>
+                <a:ea typeface="+mn-ea"/>
+                <a:cs typeface="+mn-cs"/>
+              </a:defRPr>
+            </a:lvl1pPr>
+            <a:lvl2pPr marL="457200" indent="0" algn="l" defTabSz="914400" rtl="0" eaLnBrk="1" latinLnBrk="0" hangingPunct="1">
+              <a:lnSpc>
+                <a:spcPct val="90000"/>
+              </a:lnSpc>
+              <a:spcBef>
+                <a:spcPts val="500"/>
+              </a:spcBef>
+              <a:buFont typeface="Arial" panose="020B0604020202020204" pitchFamily="34" charset="0"/>
+              <a:buNone/>
+              <a:defRPr sz="1400" kern="1200">
+                <a:solidFill>
+                  <a:schemeClr val="lt1"/>
+                </a:solidFill>
+                <a:latin typeface="+mn-lt"/>
+                <a:ea typeface="+mn-ea"/>
+                <a:cs typeface="+mn-cs"/>
+              </a:defRPr>
+            </a:lvl2pPr>
+            <a:lvl3pPr marL="914400" indent="0" algn="l" defTabSz="914400" rtl="0" eaLnBrk="1" latinLnBrk="0" hangingPunct="1">
+              <a:lnSpc>
+                <a:spcPct val="90000"/>
+              </a:lnSpc>
+              <a:spcBef>
+                <a:spcPts val="500"/>
+              </a:spcBef>
+              <a:buFont typeface="Arial" panose="020B0604020202020204" pitchFamily="34" charset="0"/>
+              <a:buNone/>
+              <a:defRPr sz="1200" kern="1200">
+                <a:solidFill>
+                  <a:schemeClr val="lt1"/>
+                </a:solidFill>
+                <a:latin typeface="+mn-lt"/>
+                <a:ea typeface="+mn-ea"/>
+                <a:cs typeface="+mn-cs"/>
+              </a:defRPr>
+            </a:lvl3pPr>
+            <a:lvl4pPr marL="1371600" indent="0" algn="l" defTabSz="914400" rtl="0" eaLnBrk="1" latinLnBrk="0" hangingPunct="1">
+              <a:lnSpc>
+                <a:spcPct val="90000"/>
+              </a:lnSpc>
+              <a:spcBef>
+                <a:spcPts val="500"/>
+              </a:spcBef>
+              <a:buFont typeface="Arial" panose="020B0604020202020204" pitchFamily="34" charset="0"/>
+              <a:buNone/>
+              <a:defRPr sz="1000" kern="1200">
+                <a:solidFill>
+                  <a:schemeClr val="lt1"/>
+                </a:solidFill>
+                <a:latin typeface="+mn-lt"/>
+                <a:ea typeface="+mn-ea"/>
+                <a:cs typeface="+mn-cs"/>
+              </a:defRPr>
+            </a:lvl4pPr>
+            <a:lvl5pPr marL="1828800" indent="0" algn="l" defTabSz="914400" rtl="0" eaLnBrk="1" latinLnBrk="0" hangingPunct="1">
+              <a:lnSpc>
+                <a:spcPct val="90000"/>
+              </a:lnSpc>
+              <a:spcBef>
+                <a:spcPts val="500"/>
+              </a:spcBef>
+              <a:buFont typeface="Arial" panose="020B0604020202020204" pitchFamily="34" charset="0"/>
+              <a:buNone/>
+              <a:defRPr sz="1000" kern="1200">
+                <a:solidFill>
+                  <a:schemeClr val="lt1"/>
+                </a:solidFill>
+                <a:latin typeface="+mn-lt"/>
+                <a:ea typeface="+mn-ea"/>
+                <a:cs typeface="+mn-cs"/>
+              </a:defRPr>
+            </a:lvl5pPr>
+            <a:lvl6pPr marL="2286000" indent="0" algn="l" defTabSz="914400" rtl="0" eaLnBrk="1" latinLnBrk="0" hangingPunct="1">
+              <a:lnSpc>
+                <a:spcPct val="90000"/>
+              </a:lnSpc>
+              <a:spcBef>
+                <a:spcPts val="500"/>
+              </a:spcBef>
+              <a:buFont typeface="Arial" panose="020B0604020202020204" pitchFamily="34" charset="0"/>
+              <a:buNone/>
+              <a:defRPr sz="1000" kern="1200">
+                <a:solidFill>
+                  <a:schemeClr val="lt1"/>
+                </a:solidFill>
+                <a:latin typeface="+mn-lt"/>
+                <a:ea typeface="+mn-ea"/>
+                <a:cs typeface="+mn-cs"/>
+              </a:defRPr>
+            </a:lvl6pPr>
+            <a:lvl7pPr marL="2743200" indent="0" algn="l" defTabSz="914400" rtl="0" eaLnBrk="1" latinLnBrk="0" hangingPunct="1">
+              <a:lnSpc>
+                <a:spcPct val="90000"/>
+              </a:lnSpc>
+              <a:spcBef>
+                <a:spcPts val="500"/>
+              </a:spcBef>
+              <a:buFont typeface="Arial" panose="020B0604020202020204" pitchFamily="34" charset="0"/>
+              <a:buNone/>
+              <a:defRPr sz="1000" kern="1200">
+                <a:solidFill>
+                  <a:schemeClr val="lt1"/>
+                </a:solidFill>
+                <a:latin typeface="+mn-lt"/>
+                <a:ea typeface="+mn-ea"/>
+                <a:cs typeface="+mn-cs"/>
+              </a:defRPr>
+            </a:lvl7pPr>
+            <a:lvl8pPr marL="3200400" indent="0" algn="l" defTabSz="914400" rtl="0" eaLnBrk="1" latinLnBrk="0" hangingPunct="1">
+              <a:lnSpc>
+                <a:spcPct val="90000"/>
+              </a:lnSpc>
+              <a:spcBef>
+                <a:spcPts val="500"/>
+              </a:spcBef>
+              <a:buFont typeface="Arial" panose="020B0604020202020204" pitchFamily="34" charset="0"/>
+              <a:buNone/>
+              <a:defRPr sz="1000" kern="1200">
+                <a:solidFill>
+                  <a:schemeClr val="lt1"/>
+                </a:solidFill>
+                <a:latin typeface="+mn-lt"/>
+                <a:ea typeface="+mn-ea"/>
+                <a:cs typeface="+mn-cs"/>
+              </a:defRPr>
+            </a:lvl8pPr>
+            <a:lvl9pPr marL="3657600" indent="0" algn="l" defTabSz="914400" rtl="0" eaLnBrk="1" latinLnBrk="0" hangingPunct="1">
+              <a:lnSpc>
+                <a:spcPct val="90000"/>
+              </a:lnSpc>
+              <a:spcBef>
+                <a:spcPts val="500"/>
+              </a:spcBef>
+              <a:buFont typeface="Arial" panose="020B0604020202020204" pitchFamily="34" charset="0"/>
+              <a:buNone/>
+              <a:defRPr sz="1000" kern="1200">
+                <a:solidFill>
+                  <a:schemeClr val="lt1"/>
+                </a:solidFill>
+                <a:latin typeface="+mn-lt"/>
+                <a:ea typeface="+mn-ea"/>
+                <a:cs typeface="+mn-cs"/>
+              </a:defRPr>
+            </a:lvl9pPr>
+          </a:lstStyle>
+          <a:p>
+            <a:pPr marL="285750" indent="-285750">
+              <a:buFont typeface="Arial" panose="020B0604020202020204" pitchFamily="34" charset="0"/>
+              <a:buChar char="•"/>
+            </a:pPr>
+            <a:r>
+              <a:rPr lang="en-US" b="1" dirty="0">
+                <a:solidFill>
+                  <a:schemeClr val="accent1"/>
+                </a:solidFill>
+              </a:rPr>
+              <a:t>Phoenix has over all higher construction site with shorter activity</a:t>
+            </a:r>
+          </a:p>
+          <a:p>
+            <a:pPr marL="285750" indent="-285750">
+              <a:buFont typeface="Arial" panose="020B0604020202020204" pitchFamily="34" charset="0"/>
+              <a:buChar char="•"/>
+            </a:pPr>
+            <a:r>
+              <a:rPr lang="en-US" b="1" dirty="0">
+                <a:solidFill>
+                  <a:schemeClr val="accent1"/>
+                </a:solidFill>
+              </a:rPr>
+              <a:t>NY state has two cities within top 5 cities with active constructions </a:t>
+            </a:r>
+          </a:p>
+        </p:txBody>
+      </p:sp>
     </p:spTree>
     <p:extLst>
       <p:ext uri="{BB962C8B-B14F-4D97-AF65-F5344CB8AC3E}">

</xml_diff>